<commit_message>
End of day 2
</commit_message>
<xml_diff>
--- a/Python_Preso_Mar2021.pptx
+++ b/Python_Preso_Mar2021.pptx
@@ -17,39 +17,41 @@
     <p:sldId id="267" r:id="rId11"/>
     <p:sldId id="288" r:id="rId12"/>
     <p:sldId id="266" r:id="rId13"/>
-    <p:sldId id="307" r:id="rId14"/>
-    <p:sldId id="308" r:id="rId15"/>
-    <p:sldId id="259" r:id="rId16"/>
-    <p:sldId id="260" r:id="rId17"/>
-    <p:sldId id="262" r:id="rId18"/>
-    <p:sldId id="289" r:id="rId19"/>
-    <p:sldId id="290" r:id="rId20"/>
-    <p:sldId id="291" r:id="rId21"/>
-    <p:sldId id="265" r:id="rId22"/>
-    <p:sldId id="264" r:id="rId23"/>
-    <p:sldId id="312" r:id="rId24"/>
-    <p:sldId id="270" r:id="rId25"/>
-    <p:sldId id="272" r:id="rId26"/>
-    <p:sldId id="263" r:id="rId27"/>
-    <p:sldId id="271" r:id="rId28"/>
-    <p:sldId id="273" r:id="rId29"/>
-    <p:sldId id="275" r:id="rId30"/>
-    <p:sldId id="276" r:id="rId31"/>
-    <p:sldId id="277" r:id="rId32"/>
-    <p:sldId id="274" r:id="rId33"/>
-    <p:sldId id="283" r:id="rId34"/>
-    <p:sldId id="284" r:id="rId35"/>
-    <p:sldId id="294" r:id="rId36"/>
-    <p:sldId id="295" r:id="rId37"/>
-    <p:sldId id="296" r:id="rId38"/>
-    <p:sldId id="298" r:id="rId39"/>
-    <p:sldId id="299" r:id="rId40"/>
-    <p:sldId id="300" r:id="rId41"/>
-    <p:sldId id="301" r:id="rId42"/>
-    <p:sldId id="302" r:id="rId43"/>
-    <p:sldId id="303" r:id="rId44"/>
-    <p:sldId id="309" r:id="rId45"/>
-    <p:sldId id="311" r:id="rId46"/>
+    <p:sldId id="313" r:id="rId14"/>
+    <p:sldId id="314" r:id="rId15"/>
+    <p:sldId id="307" r:id="rId16"/>
+    <p:sldId id="308" r:id="rId17"/>
+    <p:sldId id="259" r:id="rId18"/>
+    <p:sldId id="260" r:id="rId19"/>
+    <p:sldId id="262" r:id="rId20"/>
+    <p:sldId id="289" r:id="rId21"/>
+    <p:sldId id="290" r:id="rId22"/>
+    <p:sldId id="291" r:id="rId23"/>
+    <p:sldId id="265" r:id="rId24"/>
+    <p:sldId id="264" r:id="rId25"/>
+    <p:sldId id="312" r:id="rId26"/>
+    <p:sldId id="270" r:id="rId27"/>
+    <p:sldId id="272" r:id="rId28"/>
+    <p:sldId id="263" r:id="rId29"/>
+    <p:sldId id="271" r:id="rId30"/>
+    <p:sldId id="273" r:id="rId31"/>
+    <p:sldId id="275" r:id="rId32"/>
+    <p:sldId id="276" r:id="rId33"/>
+    <p:sldId id="277" r:id="rId34"/>
+    <p:sldId id="274" r:id="rId35"/>
+    <p:sldId id="283" r:id="rId36"/>
+    <p:sldId id="284" r:id="rId37"/>
+    <p:sldId id="294" r:id="rId38"/>
+    <p:sldId id="295" r:id="rId39"/>
+    <p:sldId id="296" r:id="rId40"/>
+    <p:sldId id="298" r:id="rId41"/>
+    <p:sldId id="299" r:id="rId42"/>
+    <p:sldId id="300" r:id="rId43"/>
+    <p:sldId id="301" r:id="rId44"/>
+    <p:sldId id="302" r:id="rId45"/>
+    <p:sldId id="303" r:id="rId46"/>
+    <p:sldId id="309" r:id="rId47"/>
+    <p:sldId id="311" r:id="rId48"/>
   </p:sldIdLst>
   <p:sldSz cx="12192000" cy="6858000"/>
   <p:notesSz cx="6858000" cy="9144000"/>
@@ -3515,7 +3517,13 @@
       </p:grpSpPr>
       <p:sp>
         <p:nvSpPr>
-          <p:cNvPr id="2" name="Title 1"/>
+          <p:cNvPr id="2" name="Title 1">
+            <a:extLst>
+              <a:ext uri="{FF2B5EF4-FFF2-40B4-BE49-F238E27FC236}">
+                <a16:creationId xmlns:a16="http://schemas.microsoft.com/office/drawing/2014/main" id="{6C89FB54-1387-4B91-AE92-018360FDC7A0}"/>
+              </a:ext>
+            </a:extLst>
+          </p:cNvPr>
           <p:cNvSpPr>
             <a:spLocks noGrp="1"/>
           </p:cNvSpPr>
@@ -3530,14 +3538,20 @@
           <a:p>
             <a:r>
               <a:rPr lang="en-GB" dirty="0"/>
-              <a:t>Equality and Assignment</a:t>
-            </a:r>
-          </a:p>
-        </p:txBody>
-      </p:sp>
-      <p:sp>
-        <p:nvSpPr>
-          <p:cNvPr id="3" name="Content Placeholder 2"/>
+              <a:t>By Reference or By Value</a:t>
+            </a:r>
+          </a:p>
+        </p:txBody>
+      </p:sp>
+      <p:sp>
+        <p:nvSpPr>
+          <p:cNvPr id="3" name="Content Placeholder 2">
+            <a:extLst>
+              <a:ext uri="{FF2B5EF4-FFF2-40B4-BE49-F238E27FC236}">
+                <a16:creationId xmlns:a16="http://schemas.microsoft.com/office/drawing/2014/main" id="{8B859F55-3D73-489A-8ED3-0CD9F6942C4A}"/>
+              </a:ext>
+            </a:extLst>
+          </p:cNvPr>
           <p:cNvSpPr>
             <a:spLocks noGrp="1"/>
           </p:cNvSpPr>
@@ -3552,13 +3566,49 @@
           <a:p>
             <a:r>
               <a:rPr lang="en-GB" dirty="0"/>
-              <a:t>Python uses = for assignment</a:t>
-            </a:r>
-          </a:p>
-          <a:p>
-            <a:r>
-              <a:rPr lang="en-GB" dirty="0"/>
-              <a:t>For testing equality use ==</a:t>
+              <a:t>All simple variables are handled by value</a:t>
+            </a:r>
+          </a:p>
+          <a:p>
+            <a:pPr lvl="1"/>
+            <a:r>
+              <a:rPr lang="en-GB" dirty="0"/>
+              <a:t>a = 1</a:t>
+            </a:r>
+          </a:p>
+          <a:p>
+            <a:pPr lvl="1"/>
+            <a:r>
+              <a:rPr lang="en-GB" dirty="0"/>
+              <a:t>b = </a:t>
+            </a:r>
+            <a:r>
+              <a:rPr lang="en-GB"/>
+              <a:t>a       # </a:t>
+            </a:r>
+            <a:r>
+              <a:rPr lang="en-GB" dirty="0"/>
+              <a:t>b now has the value 1</a:t>
+            </a:r>
+          </a:p>
+          <a:p>
+            <a:r>
+              <a:rPr lang="en-GB" dirty="0"/>
+              <a:t>All other structures are handled by reference</a:t>
+            </a:r>
+          </a:p>
+          <a:p>
+            <a:pPr lvl="1"/>
+            <a:r>
+              <a:rPr lang="en-GB" dirty="0"/>
+              <a:t>t1 = (5,4,3)</a:t>
+            </a:r>
+          </a:p>
+          <a:p>
+            <a:pPr lvl="1"/>
+            <a:r>
+              <a:rPr lang="en-GB" dirty="0"/>
+              <a:t>t2 =t1      # t1 and t2 refer to the SAME tuple, containing 5, 4, 3</a:t>
             </a:r>
           </a:p>
         </p:txBody>
@@ -3566,7 +3616,7 @@
     </p:spTree>
     <p:extLst>
       <p:ext uri="{BB962C8B-B14F-4D97-AF65-F5344CB8AC3E}">
-        <p14:creationId xmlns:p14="http://schemas.microsoft.com/office/powerpoint/2010/main" val="958892044"/>
+        <p14:creationId xmlns:p14="http://schemas.microsoft.com/office/powerpoint/2010/main" val="3850493670"/>
       </p:ext>
     </p:extLst>
   </p:cSld>
@@ -3595,6 +3645,224 @@
       </p:grpSpPr>
       <p:sp>
         <p:nvSpPr>
+          <p:cNvPr id="2" name="Title 1">
+            <a:extLst>
+              <a:ext uri="{FF2B5EF4-FFF2-40B4-BE49-F238E27FC236}">
+                <a16:creationId xmlns:a16="http://schemas.microsoft.com/office/drawing/2014/main" id="{AC65D802-3A03-4AC3-B543-084EFA072758}"/>
+              </a:ext>
+            </a:extLst>
+          </p:cNvPr>
+          <p:cNvSpPr>
+            <a:spLocks noGrp="1"/>
+          </p:cNvSpPr>
+          <p:nvPr>
+            <p:ph type="title"/>
+          </p:nvPr>
+        </p:nvSpPr>
+        <p:spPr>
+          <a:xfrm>
+            <a:off x="838200" y="365126"/>
+            <a:ext cx="10515600" cy="667852"/>
+          </a:xfrm>
+        </p:spPr>
+        <p:txBody>
+          <a:bodyPr>
+            <a:normAutofit fontScale="90000"/>
+          </a:bodyPr>
+          <a:lstStyle/>
+          <a:p>
+            <a:r>
+              <a:rPr lang="en-GB" dirty="0"/>
+              <a:t>Shallow and Deep</a:t>
+            </a:r>
+          </a:p>
+        </p:txBody>
+      </p:sp>
+      <p:sp>
+        <p:nvSpPr>
+          <p:cNvPr id="3" name="Content Placeholder 2">
+            <a:extLst>
+              <a:ext uri="{FF2B5EF4-FFF2-40B4-BE49-F238E27FC236}">
+                <a16:creationId xmlns:a16="http://schemas.microsoft.com/office/drawing/2014/main" id="{75F88845-C4F6-4910-8F9C-0EEC6E96D49C}"/>
+              </a:ext>
+            </a:extLst>
+          </p:cNvPr>
+          <p:cNvSpPr>
+            <a:spLocks noGrp="1"/>
+          </p:cNvSpPr>
+          <p:nvPr>
+            <p:ph idx="1"/>
+          </p:nvPr>
+        </p:nvSpPr>
+        <p:spPr>
+          <a:xfrm>
+            <a:off x="891729" y="6273774"/>
+            <a:ext cx="10149084" cy="667852"/>
+          </a:xfrm>
+        </p:spPr>
+        <p:txBody>
+          <a:bodyPr>
+            <a:normAutofit/>
+          </a:bodyPr>
+          <a:lstStyle/>
+          <a:p>
+            <a:pPr marL="0" indent="0">
+              <a:buNone/>
+            </a:pPr>
+            <a:r>
+              <a:rPr lang="en-GB" dirty="0">
+                <a:hlinkClick r:id="rId2"/>
+              </a:rPr>
+              <a:t>https://realpython.com/copying-python-objects/</a:t>
+            </a:r>
+            <a:endParaRPr lang="en-GB" dirty="0"/>
+          </a:p>
+          <a:p>
+            <a:endParaRPr lang="en-GB" dirty="0"/>
+          </a:p>
+        </p:txBody>
+      </p:sp>
+      <p:pic>
+        <p:nvPicPr>
+          <p:cNvPr id="5" name="Picture 4">
+            <a:extLst>
+              <a:ext uri="{FF2B5EF4-FFF2-40B4-BE49-F238E27FC236}">
+                <a16:creationId xmlns:a16="http://schemas.microsoft.com/office/drawing/2014/main" id="{AE31CA6E-5604-4E5E-B1AC-5770AFC39E83}"/>
+              </a:ext>
+            </a:extLst>
+          </p:cNvPr>
+          <p:cNvPicPr>
+            <a:picLocks noChangeAspect="1"/>
+          </p:cNvPicPr>
+          <p:nvPr/>
+        </p:nvPicPr>
+        <p:blipFill rotWithShape="1">
+          <a:blip r:embed="rId3"/>
+          <a:srcRect l="7706" t="4082" r="20755" b="16755"/>
+          <a:stretch/>
+        </p:blipFill>
+        <p:spPr>
+          <a:xfrm>
+            <a:off x="997526" y="1125997"/>
+            <a:ext cx="7757967" cy="4828940"/>
+          </a:xfrm>
+          <a:prstGeom prst="rect">
+            <a:avLst/>
+          </a:prstGeom>
+        </p:spPr>
+      </p:pic>
+    </p:spTree>
+    <p:extLst>
+      <p:ext uri="{BB962C8B-B14F-4D97-AF65-F5344CB8AC3E}">
+        <p14:creationId xmlns:p14="http://schemas.microsoft.com/office/powerpoint/2010/main" val="3573294632"/>
+      </p:ext>
+    </p:extLst>
+  </p:cSld>
+  <p:clrMapOvr>
+    <a:masterClrMapping/>
+  </p:clrMapOvr>
+</p:sld>
+</file>
+
+<file path=ppt/slides/slide15.xml><?xml version="1.0" encoding="utf-8"?>
+<p:sld xmlns:a="http://schemas.openxmlformats.org/drawingml/2006/main" xmlns:r="http://schemas.openxmlformats.org/officeDocument/2006/relationships" xmlns:p="http://schemas.openxmlformats.org/presentationml/2006/main">
+  <p:cSld>
+    <p:spTree>
+      <p:nvGrpSpPr>
+        <p:cNvPr id="1" name=""/>
+        <p:cNvGrpSpPr/>
+        <p:nvPr/>
+      </p:nvGrpSpPr>
+      <p:grpSpPr>
+        <a:xfrm>
+          <a:off x="0" y="0"/>
+          <a:ext cx="0" cy="0"/>
+          <a:chOff x="0" y="0"/>
+          <a:chExt cx="0" cy="0"/>
+        </a:xfrm>
+      </p:grpSpPr>
+      <p:sp>
+        <p:nvSpPr>
+          <p:cNvPr id="2" name="Title 1"/>
+          <p:cNvSpPr>
+            <a:spLocks noGrp="1"/>
+          </p:cNvSpPr>
+          <p:nvPr>
+            <p:ph type="title"/>
+          </p:nvPr>
+        </p:nvSpPr>
+        <p:spPr/>
+        <p:txBody>
+          <a:bodyPr/>
+          <a:lstStyle/>
+          <a:p>
+            <a:r>
+              <a:rPr lang="en-GB" dirty="0"/>
+              <a:t>Equality and Assignment</a:t>
+            </a:r>
+          </a:p>
+        </p:txBody>
+      </p:sp>
+      <p:sp>
+        <p:nvSpPr>
+          <p:cNvPr id="3" name="Content Placeholder 2"/>
+          <p:cNvSpPr>
+            <a:spLocks noGrp="1"/>
+          </p:cNvSpPr>
+          <p:nvPr>
+            <p:ph idx="1"/>
+          </p:nvPr>
+        </p:nvSpPr>
+        <p:spPr/>
+        <p:txBody>
+          <a:bodyPr/>
+          <a:lstStyle/>
+          <a:p>
+            <a:r>
+              <a:rPr lang="en-GB" dirty="0"/>
+              <a:t>Python uses = for assignment</a:t>
+            </a:r>
+          </a:p>
+          <a:p>
+            <a:r>
+              <a:rPr lang="en-GB" dirty="0"/>
+              <a:t>For testing equality use ==</a:t>
+            </a:r>
+          </a:p>
+        </p:txBody>
+      </p:sp>
+    </p:spTree>
+    <p:extLst>
+      <p:ext uri="{BB962C8B-B14F-4D97-AF65-F5344CB8AC3E}">
+        <p14:creationId xmlns:p14="http://schemas.microsoft.com/office/powerpoint/2010/main" val="958892044"/>
+      </p:ext>
+    </p:extLst>
+  </p:cSld>
+  <p:clrMapOvr>
+    <a:masterClrMapping/>
+  </p:clrMapOvr>
+</p:sld>
+</file>
+
+<file path=ppt/slides/slide16.xml><?xml version="1.0" encoding="utf-8"?>
+<p:sld xmlns:a="http://schemas.openxmlformats.org/drawingml/2006/main" xmlns:r="http://schemas.openxmlformats.org/officeDocument/2006/relationships" xmlns:p="http://schemas.openxmlformats.org/presentationml/2006/main">
+  <p:cSld>
+    <p:spTree>
+      <p:nvGrpSpPr>
+        <p:cNvPr id="1" name=""/>
+        <p:cNvGrpSpPr/>
+        <p:nvPr/>
+      </p:nvGrpSpPr>
+      <p:grpSpPr>
+        <a:xfrm>
+          <a:off x="0" y="0"/>
+          <a:ext cx="0" cy="0"/>
+          <a:chOff x="0" y="0"/>
+          <a:chExt cx="0" cy="0"/>
+        </a:xfrm>
+      </p:grpSpPr>
+      <p:sp>
+        <p:nvSpPr>
           <p:cNvPr id="2" name="Title 1"/>
           <p:cNvSpPr>
             <a:spLocks noGrp="1"/>
@@ -3736,7 +4004,7 @@
 </p:sld>
 </file>
 
-<file path=ppt/slides/slide15.xml><?xml version="1.0" encoding="utf-8"?>
+<file path=ppt/slides/slide17.xml><?xml version="1.0" encoding="utf-8"?>
 <p:sld xmlns:a="http://schemas.openxmlformats.org/drawingml/2006/main" xmlns:r="http://schemas.openxmlformats.org/officeDocument/2006/relationships" xmlns:p="http://schemas.openxmlformats.org/presentationml/2006/main">
   <p:cSld>
     <p:spTree>
@@ -4586,7 +4854,7 @@
 </p:sld>
 </file>
 
-<file path=ppt/slides/slide16.xml><?xml version="1.0" encoding="utf-8"?>
+<file path=ppt/slides/slide18.xml><?xml version="1.0" encoding="utf-8"?>
 <p:sld xmlns:a="http://schemas.openxmlformats.org/drawingml/2006/main" xmlns:r="http://schemas.openxmlformats.org/officeDocument/2006/relationships" xmlns:p="http://schemas.openxmlformats.org/presentationml/2006/main">
   <p:cSld>
     <p:spTree>
@@ -5222,280 +5490,6 @@
 </p:sld>
 </file>
 
-<file path=ppt/slides/slide17.xml><?xml version="1.0" encoding="utf-8"?>
-<p:sld xmlns:a="http://schemas.openxmlformats.org/drawingml/2006/main" xmlns:r="http://schemas.openxmlformats.org/officeDocument/2006/relationships" xmlns:p="http://schemas.openxmlformats.org/presentationml/2006/main">
-  <p:cSld>
-    <p:spTree>
-      <p:nvGrpSpPr>
-        <p:cNvPr id="1" name=""/>
-        <p:cNvGrpSpPr/>
-        <p:nvPr/>
-      </p:nvGrpSpPr>
-      <p:grpSpPr>
-        <a:xfrm>
-          <a:off x="0" y="0"/>
-          <a:ext cx="0" cy="0"/>
-          <a:chOff x="0" y="0"/>
-          <a:chExt cx="0" cy="0"/>
-        </a:xfrm>
-      </p:grpSpPr>
-      <p:sp>
-        <p:nvSpPr>
-          <p:cNvPr id="2" name="Title 1"/>
-          <p:cNvSpPr>
-            <a:spLocks noGrp="1"/>
-          </p:cNvSpPr>
-          <p:nvPr>
-            <p:ph type="title"/>
-          </p:nvPr>
-        </p:nvSpPr>
-        <p:spPr/>
-        <p:txBody>
-          <a:bodyPr/>
-          <a:lstStyle/>
-          <a:p>
-            <a:r>
-              <a:rPr lang="en-GB" dirty="0"/>
-              <a:t>Computers are good at binary</a:t>
-            </a:r>
-          </a:p>
-        </p:txBody>
-      </p:sp>
-      <p:sp>
-        <p:nvSpPr>
-          <p:cNvPr id="3" name="Content Placeholder 2"/>
-          <p:cNvSpPr>
-            <a:spLocks noGrp="1"/>
-          </p:cNvSpPr>
-          <p:nvPr>
-            <p:ph idx="1"/>
-          </p:nvPr>
-        </p:nvSpPr>
-        <p:spPr/>
-        <p:txBody>
-          <a:bodyPr>
-            <a:normAutofit lnSpcReduction="10000"/>
-          </a:bodyPr>
-          <a:lstStyle/>
-          <a:p>
-            <a:r>
-              <a:rPr lang="en-GB" dirty="0"/>
-              <a:t>Real numbers are a problem, but Python is unusual in handling really huge numbers well</a:t>
-            </a:r>
-          </a:p>
-          <a:p>
-            <a:r>
-              <a:rPr lang="en-GB" dirty="0"/>
-              <a:t>Can express literal integers in three bases besides decimal:</a:t>
-            </a:r>
-          </a:p>
-          <a:p>
-            <a:pPr lvl="1"/>
-            <a:r>
-              <a:rPr lang="en-GB" dirty="0"/>
-              <a:t>0b or 0B for binary (base 2)</a:t>
-            </a:r>
-          </a:p>
-          <a:p>
-            <a:pPr lvl="1"/>
-            <a:r>
-              <a:rPr lang="en-GB" dirty="0"/>
-              <a:t>0o or 0O for octal (base 8)</a:t>
-            </a:r>
-          </a:p>
-          <a:p>
-            <a:pPr lvl="1"/>
-            <a:r>
-              <a:rPr lang="en-GB" dirty="0"/>
-              <a:t>0x or 0X for hex (base 16)</a:t>
-            </a:r>
-          </a:p>
-          <a:p>
-            <a:r>
-              <a:rPr lang="en-GB" dirty="0"/>
-              <a:t>How big is an </a:t>
-            </a:r>
-            <a:r>
-              <a:rPr lang="en-GB" dirty="0" err="1"/>
-              <a:t>int</a:t>
-            </a:r>
-            <a:endParaRPr lang="en-GB" dirty="0"/>
-          </a:p>
-          <a:p>
-            <a:pPr lvl="1"/>
-            <a:r>
-              <a:rPr lang="en-GB" dirty="0"/>
-              <a:t>An </a:t>
-            </a:r>
-            <a:r>
-              <a:rPr lang="en-GB" dirty="0" err="1"/>
-              <a:t>int</a:t>
-            </a:r>
-            <a:r>
-              <a:rPr lang="en-GB" dirty="0"/>
-              <a:t> can be any size</a:t>
-            </a:r>
-          </a:p>
-          <a:p>
-            <a:pPr lvl="1"/>
-            <a:r>
-              <a:rPr lang="en-GB" dirty="0"/>
-              <a:t>Even greater than 64 bits e.g. googol = 10**100</a:t>
-            </a:r>
-          </a:p>
-          <a:p>
-            <a:r>
-              <a:rPr lang="en-GB" dirty="0"/>
-              <a:t>There is a Math package too</a:t>
-            </a:r>
-          </a:p>
-        </p:txBody>
-      </p:sp>
-    </p:spTree>
-    <p:extLst>
-      <p:ext uri="{BB962C8B-B14F-4D97-AF65-F5344CB8AC3E}">
-        <p14:creationId xmlns:p14="http://schemas.microsoft.com/office/powerpoint/2010/main" val="1315247349"/>
-      </p:ext>
-    </p:extLst>
-  </p:cSld>
-  <p:clrMapOvr>
-    <a:masterClrMapping/>
-  </p:clrMapOvr>
-</p:sld>
-</file>
-
-<file path=ppt/slides/slide18.xml><?xml version="1.0" encoding="utf-8"?>
-<p:sld xmlns:a="http://schemas.openxmlformats.org/drawingml/2006/main" xmlns:r="http://schemas.openxmlformats.org/officeDocument/2006/relationships" xmlns:p="http://schemas.openxmlformats.org/presentationml/2006/main">
-  <p:cSld>
-    <p:spTree>
-      <p:nvGrpSpPr>
-        <p:cNvPr id="1" name=""/>
-        <p:cNvGrpSpPr/>
-        <p:nvPr/>
-      </p:nvGrpSpPr>
-      <p:grpSpPr>
-        <a:xfrm>
-          <a:off x="0" y="0"/>
-          <a:ext cx="0" cy="0"/>
-          <a:chOff x="0" y="0"/>
-          <a:chExt cx="0" cy="0"/>
-        </a:xfrm>
-      </p:grpSpPr>
-      <p:sp>
-        <p:nvSpPr>
-          <p:cNvPr id="2" name="Title 1"/>
-          <p:cNvSpPr>
-            <a:spLocks noGrp="1"/>
-          </p:cNvSpPr>
-          <p:nvPr>
-            <p:ph type="title"/>
-          </p:nvPr>
-        </p:nvSpPr>
-        <p:spPr/>
-        <p:txBody>
-          <a:bodyPr/>
-          <a:lstStyle/>
-          <a:p>
-            <a:r>
-              <a:rPr lang="en-GB" dirty="0"/>
-              <a:t>Boolean</a:t>
-            </a:r>
-          </a:p>
-        </p:txBody>
-      </p:sp>
-      <p:sp>
-        <p:nvSpPr>
-          <p:cNvPr id="3" name="Content Placeholder 2"/>
-          <p:cNvSpPr>
-            <a:spLocks noGrp="1"/>
-          </p:cNvSpPr>
-          <p:nvPr>
-            <p:ph idx="1"/>
-          </p:nvPr>
-        </p:nvSpPr>
-        <p:spPr/>
-        <p:txBody>
-          <a:bodyPr/>
-          <a:lstStyle/>
-          <a:p>
-            <a:r>
-              <a:rPr lang="en-GB" dirty="0"/>
-              <a:t>Python’s simplest data type is the </a:t>
-            </a:r>
-            <a:r>
-              <a:rPr lang="en-GB" dirty="0" err="1"/>
-              <a:t>boolean</a:t>
-            </a:r>
-            <a:r>
-              <a:rPr lang="en-GB" dirty="0"/>
-              <a:t>, which has only the values True and False (note the case)</a:t>
-            </a:r>
-          </a:p>
-          <a:p>
-            <a:r>
-              <a:rPr lang="en-GB" dirty="0"/>
-              <a:t>When converted to integers, they represent the values 1 and 0</a:t>
-            </a:r>
-          </a:p>
-          <a:p>
-            <a:pPr lvl="1"/>
-            <a:r>
-              <a:rPr lang="en-GB" dirty="0"/>
-              <a:t>&gt;&gt;&gt; </a:t>
-            </a:r>
-            <a:r>
-              <a:rPr lang="en-GB" dirty="0" err="1"/>
-              <a:t>int</a:t>
-            </a:r>
-            <a:r>
-              <a:rPr lang="en-GB" dirty="0"/>
-              <a:t>(True)</a:t>
-            </a:r>
-          </a:p>
-          <a:p>
-            <a:pPr lvl="1"/>
-            <a:r>
-              <a:rPr lang="en-GB" dirty="0"/>
-              <a:t>1</a:t>
-            </a:r>
-          </a:p>
-          <a:p>
-            <a:pPr lvl="1"/>
-            <a:r>
-              <a:rPr lang="en-GB" dirty="0"/>
-              <a:t>&gt;&gt;&gt; </a:t>
-            </a:r>
-            <a:r>
-              <a:rPr lang="en-GB" dirty="0" err="1"/>
-              <a:t>int</a:t>
-            </a:r>
-            <a:r>
-              <a:rPr lang="en-GB" dirty="0"/>
-              <a:t>(False)</a:t>
-            </a:r>
-          </a:p>
-          <a:p>
-            <a:pPr lvl="1"/>
-            <a:r>
-              <a:rPr lang="en-GB" dirty="0"/>
-              <a:t>0</a:t>
-            </a:r>
-          </a:p>
-        </p:txBody>
-      </p:sp>
-    </p:spTree>
-    <p:extLst>
-      <p:ext uri="{BB962C8B-B14F-4D97-AF65-F5344CB8AC3E}">
-        <p14:creationId xmlns:p14="http://schemas.microsoft.com/office/powerpoint/2010/main" val="4252101924"/>
-      </p:ext>
-    </p:extLst>
-  </p:cSld>
-  <p:clrMapOvr>
-    <a:masterClrMapping/>
-  </p:clrMapOvr>
-</p:sld>
-</file>
-
 <file path=ppt/slides/slide19.xml><?xml version="1.0" encoding="utf-8"?>
 <p:sld xmlns:a="http://schemas.openxmlformats.org/drawingml/2006/main" xmlns:r="http://schemas.openxmlformats.org/officeDocument/2006/relationships" xmlns:p="http://schemas.openxmlformats.org/presentationml/2006/main">
   <p:cSld>
@@ -5530,7 +5524,7 @@
           <a:p>
             <a:r>
               <a:rPr lang="en-GB" dirty="0"/>
-              <a:t>Type Conversions</a:t>
+              <a:t>Computers are good at binary</a:t>
             </a:r>
           </a:p>
         </p:txBody>
@@ -5548,40 +5542,58 @@
         <p:spPr/>
         <p:txBody>
           <a:bodyPr>
-            <a:normAutofit/>
+            <a:normAutofit lnSpcReduction="10000"/>
           </a:bodyPr>
           <a:lstStyle/>
           <a:p>
             <a:r>
               <a:rPr lang="en-GB" dirty="0"/>
-              <a:t>To change other Python data types to an integer use the </a:t>
+              <a:t>Real numbers are a problem, but Python is unusual in handling really huge numbers well</a:t>
+            </a:r>
+          </a:p>
+          <a:p>
+            <a:r>
+              <a:rPr lang="en-GB" dirty="0"/>
+              <a:t>Can express literal integers in three bases besides decimal:</a:t>
+            </a:r>
+          </a:p>
+          <a:p>
+            <a:pPr lvl="1"/>
+            <a:r>
+              <a:rPr lang="en-GB" dirty="0"/>
+              <a:t>0b or 0B for binary (base 2)</a:t>
+            </a:r>
+          </a:p>
+          <a:p>
+            <a:pPr lvl="1"/>
+            <a:r>
+              <a:rPr lang="en-GB" dirty="0"/>
+              <a:t>0o or 0O for octal (base 8)</a:t>
+            </a:r>
+          </a:p>
+          <a:p>
+            <a:pPr lvl="1"/>
+            <a:r>
+              <a:rPr lang="en-GB" dirty="0"/>
+              <a:t>0x or 0X for hex (base 16)</a:t>
+            </a:r>
+          </a:p>
+          <a:p>
+            <a:r>
+              <a:rPr lang="en-GB" dirty="0"/>
+              <a:t>How big is an </a:t>
             </a:r>
             <a:r>
               <a:rPr lang="en-GB" dirty="0" err="1"/>
               <a:t>int</a:t>
             </a:r>
-            <a:r>
-              <a:rPr lang="en-GB" dirty="0"/>
-              <a:t>() function</a:t>
-            </a:r>
-          </a:p>
-          <a:p>
-            <a:r>
-              <a:rPr lang="en-GB" dirty="0"/>
-              <a:t>This will keep the whole number and discard any fractional part</a:t>
-            </a:r>
-          </a:p>
-          <a:p>
-            <a:r>
-              <a:rPr lang="en-GB" dirty="0"/>
-              <a:t>Converting a floating-point number to an integer just lops off everything after the decimal point</a:t>
-            </a:r>
-          </a:p>
-          <a:p>
-            <a:pPr lvl="1"/>
-            <a:r>
-              <a:rPr lang="en-GB" dirty="0"/>
-              <a:t>&gt;&gt;&gt; </a:t>
+            <a:endParaRPr lang="en-GB" dirty="0"/>
+          </a:p>
+          <a:p>
+            <a:pPr lvl="1"/>
+            <a:r>
+              <a:rPr lang="en-GB" dirty="0"/>
+              <a:t>An </a:t>
             </a:r>
             <a:r>
               <a:rPr lang="en-GB" dirty="0" err="1"/>
@@ -5589,47 +5601,28 @@
             </a:r>
             <a:r>
               <a:rPr lang="en-GB" dirty="0"/>
-              <a:t>(98.6)</a:t>
-            </a:r>
-          </a:p>
-          <a:p>
-            <a:pPr lvl="1"/>
-            <a:r>
-              <a:rPr lang="en-GB" dirty="0"/>
-              <a:t>98</a:t>
-            </a:r>
-          </a:p>
-          <a:p>
-            <a:pPr lvl="1"/>
-            <a:r>
-              <a:rPr lang="en-GB" dirty="0"/>
-              <a:t>&gt;&gt;&gt; </a:t>
-            </a:r>
-            <a:r>
-              <a:rPr lang="en-GB" dirty="0" err="1"/>
-              <a:t>int</a:t>
-            </a:r>
-            <a:r>
-              <a:rPr lang="en-GB" dirty="0"/>
-              <a:t>(1.0e4)</a:t>
-            </a:r>
-          </a:p>
-          <a:p>
-            <a:pPr lvl="1"/>
-            <a:r>
-              <a:rPr lang="en-GB" dirty="0"/>
-              <a:t>10000</a:t>
-            </a:r>
-          </a:p>
-          <a:p>
-            <a:endParaRPr lang="en-GB" dirty="0"/>
+              <a:t> can be any size</a:t>
+            </a:r>
+          </a:p>
+          <a:p>
+            <a:pPr lvl="1"/>
+            <a:r>
+              <a:rPr lang="en-GB" dirty="0"/>
+              <a:t>Even greater than 64 bits e.g. googol = 10**100</a:t>
+            </a:r>
+          </a:p>
+          <a:p>
+            <a:r>
+              <a:rPr lang="en-GB" dirty="0"/>
+              <a:t>There is a Math package too</a:t>
+            </a:r>
           </a:p>
         </p:txBody>
       </p:sp>
     </p:spTree>
     <p:extLst>
       <p:ext uri="{BB962C8B-B14F-4D97-AF65-F5344CB8AC3E}">
-        <p14:creationId xmlns:p14="http://schemas.microsoft.com/office/powerpoint/2010/main" val="1506879849"/>
+        <p14:creationId xmlns:p14="http://schemas.microsoft.com/office/powerpoint/2010/main" val="1315247349"/>
       </p:ext>
     </p:extLst>
   </p:cSld>
@@ -5771,7 +5764,7 @@
           <a:p>
             <a:r>
               <a:rPr lang="en-GB" dirty="0"/>
-              <a:t>Converting a text string containing only digits</a:t>
+              <a:t>Boolean</a:t>
             </a:r>
           </a:p>
         </p:txBody>
@@ -5788,18 +5781,48 @@
         </p:nvSpPr>
         <p:spPr/>
         <p:txBody>
-          <a:bodyPr>
-            <a:normAutofit/>
-          </a:bodyPr>
-          <a:lstStyle/>
-          <a:p>
+          <a:bodyPr/>
+          <a:lstStyle/>
+          <a:p>
+            <a:r>
+              <a:rPr lang="en-GB" dirty="0"/>
+              <a:t>Python’s simplest data type is the </a:t>
+            </a:r>
+            <a:r>
+              <a:rPr lang="en-GB" dirty="0" err="1"/>
+              <a:t>boolean</a:t>
+            </a:r>
+            <a:r>
+              <a:rPr lang="en-GB" dirty="0"/>
+              <a:t>, which has only the values True and False (note the case)</a:t>
+            </a:r>
+          </a:p>
+          <a:p>
+            <a:r>
+              <a:rPr lang="en-GB" dirty="0"/>
+              <a:t>When converted to integers, they represent the values 1 and 0</a:t>
+            </a:r>
+          </a:p>
+          <a:p>
+            <a:pPr lvl="1"/>
+            <a:r>
+              <a:rPr lang="en-GB" dirty="0"/>
+              <a:t>&gt;&gt;&gt; </a:t>
+            </a:r>
             <a:r>
               <a:rPr lang="en-GB" dirty="0" err="1"/>
               <a:t>int</a:t>
             </a:r>
             <a:r>
               <a:rPr lang="en-GB" dirty="0"/>
-              <a:t>() will make integers from floats or strings of digits, but won’t handle strings containing decimal points or exponents</a:t>
+              <a:t>(True)</a:t>
+            </a:r>
+          </a:p>
+          <a:p>
+            <a:pPr lvl="1"/>
+            <a:r>
+              <a:rPr lang="en-GB" dirty="0"/>
+              <a:t>1</a:t>
             </a:r>
           </a:p>
           <a:p>
@@ -5814,75 +5837,22 @@
             </a:r>
             <a:r>
               <a:rPr lang="en-GB" dirty="0"/>
-              <a:t>('99')</a:t>
-            </a:r>
-          </a:p>
-          <a:p>
-            <a:pPr lvl="1"/>
-            <a:r>
-              <a:rPr lang="en-GB" dirty="0"/>
-              <a:t>99</a:t>
-            </a:r>
-          </a:p>
-          <a:p>
-            <a:pPr lvl="1"/>
-            <a:r>
-              <a:rPr lang="en-GB" dirty="0"/>
-              <a:t>&gt;&gt;&gt; </a:t>
-            </a:r>
-            <a:r>
-              <a:rPr lang="en-GB" dirty="0" err="1"/>
-              <a:t>int</a:t>
-            </a:r>
-            <a:r>
-              <a:rPr lang="en-GB" dirty="0"/>
-              <a:t>('-23')</a:t>
-            </a:r>
-          </a:p>
-          <a:p>
-            <a:pPr lvl="1"/>
-            <a:r>
-              <a:rPr lang="en-GB" dirty="0"/>
-              <a:t>-23</a:t>
-            </a:r>
-          </a:p>
-          <a:p>
-            <a:pPr lvl="1"/>
-            <a:r>
-              <a:rPr lang="en-GB" dirty="0"/>
-              <a:t>&gt;&gt;&gt; </a:t>
-            </a:r>
-            <a:r>
-              <a:rPr lang="en-GB" dirty="0" err="1"/>
-              <a:t>int</a:t>
-            </a:r>
-            <a:r>
-              <a:rPr lang="en-GB" dirty="0"/>
-              <a:t>('+12')</a:t>
-            </a:r>
-          </a:p>
-          <a:p>
-            <a:pPr lvl="1"/>
-            <a:r>
-              <a:rPr lang="en-GB" dirty="0"/>
-              <a:t>12</a:t>
-            </a:r>
-          </a:p>
-          <a:p>
-            <a:r>
-              <a:rPr lang="en-GB" dirty="0"/>
-              <a:t>If you try to convert something that doesn’t look like a number, you’ll get an exception</a:t>
-            </a:r>
-          </a:p>
-          <a:p>
-            <a:endParaRPr lang="en-GB" dirty="0"/>
+              <a:t>(False)</a:t>
+            </a:r>
+          </a:p>
+          <a:p>
+            <a:pPr lvl="1"/>
+            <a:r>
+              <a:rPr lang="en-GB" dirty="0"/>
+              <a:t>0</a:t>
+            </a:r>
           </a:p>
         </p:txBody>
       </p:sp>
     </p:spTree>
     <p:extLst>
       <p:ext uri="{BB962C8B-B14F-4D97-AF65-F5344CB8AC3E}">
-        <p14:creationId xmlns:p14="http://schemas.microsoft.com/office/powerpoint/2010/main" val="988992461"/>
+        <p14:creationId xmlns:p14="http://schemas.microsoft.com/office/powerpoint/2010/main" val="4252101924"/>
       </p:ext>
     </p:extLst>
   </p:cSld>
@@ -5926,7 +5896,7 @@
           <a:p>
             <a:r>
               <a:rPr lang="en-GB" dirty="0"/>
-              <a:t>Writing Python Code</a:t>
+              <a:t>Type Conversions</a:t>
             </a:r>
           </a:p>
         </p:txBody>
@@ -5950,74 +5920,82 @@
           <a:p>
             <a:r>
               <a:rPr lang="en-GB" dirty="0"/>
-              <a:t>From a terminal via an interactive interpreter</a:t>
-            </a:r>
-          </a:p>
-          <a:p>
-            <a:pPr lvl="1"/>
-            <a:r>
-              <a:rPr lang="en-GB" dirty="0"/>
-              <a:t>Comes with Python </a:t>
-            </a:r>
-          </a:p>
-          <a:p>
-            <a:pPr lvl="1"/>
-            <a:r>
-              <a:rPr lang="en-GB" dirty="0"/>
-              <a:t>Enter commands line by line and see the results immediately</a:t>
-            </a:r>
-          </a:p>
-          <a:p>
-            <a:r>
-              <a:rPr lang="en-GB" dirty="0"/>
-              <a:t>In an IDE</a:t>
-            </a:r>
-          </a:p>
-          <a:p>
-            <a:pPr lvl="1"/>
-            <a:r>
-              <a:rPr lang="en-GB" dirty="0"/>
-              <a:t>IDLE</a:t>
-            </a:r>
-          </a:p>
-          <a:p>
-            <a:pPr lvl="1"/>
+              <a:t>To change other Python data types to an integer use the </a:t>
+            </a:r>
             <a:r>
               <a:rPr lang="en-GB" dirty="0" err="1"/>
-              <a:t>PyCharm</a:t>
-            </a:r>
+              <a:t>int</a:t>
+            </a:r>
+            <a:r>
+              <a:rPr lang="en-GB" dirty="0"/>
+              <a:t>() function</a:t>
+            </a:r>
+          </a:p>
+          <a:p>
+            <a:r>
+              <a:rPr lang="en-GB" dirty="0"/>
+              <a:t>This will keep the whole number and discard any fractional part</a:t>
+            </a:r>
+          </a:p>
+          <a:p>
+            <a:r>
+              <a:rPr lang="en-GB" dirty="0"/>
+              <a:t>Converting a floating-point number to an integer just lops off everything after the decimal point</a:t>
+            </a:r>
+          </a:p>
+          <a:p>
+            <a:pPr lvl="1"/>
+            <a:r>
+              <a:rPr lang="en-GB" dirty="0"/>
+              <a:t>&gt;&gt;&gt; </a:t>
+            </a:r>
+            <a:r>
+              <a:rPr lang="en-GB" dirty="0" err="1"/>
+              <a:t>int</a:t>
+            </a:r>
+            <a:r>
+              <a:rPr lang="en-GB" dirty="0"/>
+              <a:t>(98.6)</a:t>
+            </a:r>
+          </a:p>
+          <a:p>
+            <a:pPr lvl="1"/>
+            <a:r>
+              <a:rPr lang="en-GB" dirty="0"/>
+              <a:t>98</a:t>
+            </a:r>
+          </a:p>
+          <a:p>
+            <a:pPr lvl="1"/>
+            <a:r>
+              <a:rPr lang="en-GB" dirty="0"/>
+              <a:t>&gt;&gt;&gt; </a:t>
+            </a:r>
+            <a:r>
+              <a:rPr lang="en-GB" dirty="0" err="1"/>
+              <a:t>int</a:t>
+            </a:r>
+            <a:r>
+              <a:rPr lang="en-GB" dirty="0"/>
+              <a:t>(1.0e4)</a:t>
+            </a:r>
+          </a:p>
+          <a:p>
+            <a:pPr lvl="1"/>
+            <a:r>
+              <a:rPr lang="en-GB" dirty="0"/>
+              <a:t>10000</a:t>
+            </a:r>
+          </a:p>
+          <a:p>
             <a:endParaRPr lang="en-GB" dirty="0"/>
-          </a:p>
-          <a:p>
-            <a:r>
-              <a:rPr lang="en-GB" dirty="0"/>
-              <a:t>Anaconda</a:t>
-            </a:r>
-          </a:p>
-          <a:p>
-            <a:r>
-              <a:rPr lang="en-GB" dirty="0" err="1"/>
-              <a:t>IPython</a:t>
-            </a:r>
-            <a:r>
-              <a:rPr lang="en-GB" dirty="0"/>
-              <a:t>/</a:t>
-            </a:r>
-            <a:r>
-              <a:rPr lang="en-GB" dirty="0" err="1"/>
-              <a:t>Jupyter</a:t>
-            </a:r>
-            <a:r>
-              <a:rPr lang="en-GB" dirty="0"/>
-              <a:t> Notebooks</a:t>
-            </a:r>
           </a:p>
         </p:txBody>
       </p:sp>
     </p:spTree>
     <p:extLst>
       <p:ext uri="{BB962C8B-B14F-4D97-AF65-F5344CB8AC3E}">
-        <p14:creationId xmlns:p14="http://schemas.microsoft.com/office/powerpoint/2010/main" val="2216851979"/>
+        <p14:creationId xmlns:p14="http://schemas.microsoft.com/office/powerpoint/2010/main" val="1506879849"/>
       </p:ext>
     </p:extLst>
   </p:cSld>
@@ -6061,7 +6039,7 @@
           <a:p>
             <a:r>
               <a:rPr lang="en-GB" dirty="0"/>
-              <a:t>Adding Python Packages</a:t>
+              <a:t>Converting a text string containing only digits</a:t>
             </a:r>
           </a:p>
         </p:txBody>
@@ -6079,106 +6057,92 @@
         <p:spPr/>
         <p:txBody>
           <a:bodyPr>
-            <a:normAutofit fontScale="92500" lnSpcReduction="20000"/>
+            <a:normAutofit/>
           </a:bodyPr>
           <a:lstStyle/>
           <a:p>
             <a:r>
-              <a:rPr lang="en-GB" dirty="0"/>
-              <a:t>See what’s installed already</a:t>
-            </a:r>
-          </a:p>
-          <a:p>
-            <a:pPr lvl="1"/>
-            <a:r>
-              <a:rPr lang="en-GB" dirty="0"/>
-              <a:t>At a Python prompt, type help() then type modules</a:t>
-            </a:r>
-          </a:p>
-          <a:p>
-            <a:pPr lvl="1"/>
-            <a:r>
-              <a:rPr lang="en-GB" dirty="0"/>
-              <a:t>if Anaconda is installed, type </a:t>
-            </a:r>
-            <a:r>
               <a:rPr lang="en-GB" dirty="0" err="1"/>
-              <a:t>conda</a:t>
-            </a:r>
-            <a:r>
-              <a:rPr lang="en-GB" dirty="0"/>
-              <a:t> list</a:t>
-            </a:r>
-          </a:p>
-          <a:p>
-            <a:r>
-              <a:rPr lang="en-GB" dirty="0"/>
-              <a:t>Make sure pip is installed</a:t>
-            </a:r>
-          </a:p>
-          <a:p>
-            <a:pPr lvl="1"/>
-            <a:r>
-              <a:rPr lang="en-GB" dirty="0"/>
-              <a:t>At a command prompt type python -m </a:t>
+              <a:t>int</a:t>
+            </a:r>
+            <a:r>
+              <a:rPr lang="en-GB" dirty="0"/>
+              <a:t>() will make integers from floats or strings of digits, but won’t handle strings containing decimal points or exponents</a:t>
+            </a:r>
+          </a:p>
+          <a:p>
+            <a:pPr lvl="1"/>
+            <a:r>
+              <a:rPr lang="en-GB" dirty="0"/>
+              <a:t>&gt;&gt;&gt; </a:t>
             </a:r>
             <a:r>
               <a:rPr lang="en-GB" dirty="0" err="1"/>
-              <a:t>ensurepip</a:t>
-            </a:r>
-            <a:endParaRPr lang="en-GB" dirty="0"/>
-          </a:p>
-          <a:p>
-            <a:r>
-              <a:rPr lang="en-GB" dirty="0"/>
-              <a:t>Pip might need to be run from the scripts folder</a:t>
-            </a:r>
-          </a:p>
-          <a:p>
-            <a:pPr lvl="1"/>
-            <a:r>
-              <a:rPr lang="en-GB" dirty="0"/>
-              <a:t>E.g. c:/python37/scripts</a:t>
-            </a:r>
-          </a:p>
-          <a:p>
-            <a:r>
-              <a:rPr lang="en-GB" dirty="0"/>
-              <a:t>Add more packages as needed</a:t>
-            </a:r>
-          </a:p>
-          <a:p>
-            <a:pPr lvl="1"/>
-            <a:r>
-              <a:rPr lang="en-GB" dirty="0"/>
-              <a:t>E.g. at a command prompt type python –m pip install </a:t>
+              <a:t>int</a:t>
+            </a:r>
+            <a:r>
+              <a:rPr lang="en-GB" dirty="0"/>
+              <a:t>('99')</a:t>
+            </a:r>
+          </a:p>
+          <a:p>
+            <a:pPr lvl="1"/>
+            <a:r>
+              <a:rPr lang="en-GB" dirty="0"/>
+              <a:t>99</a:t>
+            </a:r>
+          </a:p>
+          <a:p>
+            <a:pPr lvl="1"/>
+            <a:r>
+              <a:rPr lang="en-GB" dirty="0"/>
+              <a:t>&gt;&gt;&gt; </a:t>
             </a:r>
             <a:r>
               <a:rPr lang="en-GB" dirty="0" err="1"/>
-              <a:t>pyperclip</a:t>
-            </a:r>
-            <a:endParaRPr lang="en-GB" dirty="0"/>
-          </a:p>
-          <a:p>
-            <a:r>
-              <a:rPr lang="en-GB" dirty="0"/>
-              <a:t>Many scientific and mathematical packages</a:t>
-            </a:r>
-          </a:p>
-          <a:p>
-            <a:pPr lvl="1"/>
+              <a:t>int</a:t>
+            </a:r>
+            <a:r>
+              <a:rPr lang="en-GB" dirty="0"/>
+              <a:t>('-23')</a:t>
+            </a:r>
+          </a:p>
+          <a:p>
+            <a:pPr lvl="1"/>
+            <a:r>
+              <a:rPr lang="en-GB" dirty="0"/>
+              <a:t>-23</a:t>
+            </a:r>
+          </a:p>
+          <a:p>
+            <a:pPr lvl="1"/>
+            <a:r>
+              <a:rPr lang="en-GB" dirty="0"/>
+              <a:t>&gt;&gt;&gt; </a:t>
+            </a:r>
             <a:r>
               <a:rPr lang="en-GB" dirty="0" err="1"/>
-              <a:t>NumPy</a:t>
-            </a:r>
-            <a:endParaRPr lang="en-GB" dirty="0"/>
-          </a:p>
-          <a:p>
-            <a:pPr lvl="1"/>
-            <a:r>
-              <a:rPr lang="en-GB" dirty="0" err="1"/>
-              <a:t>SciPy</a:t>
-            </a:r>
+              <a:t>int</a:t>
+            </a:r>
+            <a:r>
+              <a:rPr lang="en-GB" dirty="0"/>
+              <a:t>('+12')</a:t>
+            </a:r>
+          </a:p>
+          <a:p>
+            <a:pPr lvl="1"/>
+            <a:r>
+              <a:rPr lang="en-GB" dirty="0"/>
+              <a:t>12</a:t>
+            </a:r>
+          </a:p>
+          <a:p>
+            <a:r>
+              <a:rPr lang="en-GB" dirty="0"/>
+              <a:t>If you try to convert something that doesn’t look like a number, you’ll get an exception</a:t>
+            </a:r>
+          </a:p>
+          <a:p>
             <a:endParaRPr lang="en-GB" dirty="0"/>
           </a:p>
         </p:txBody>
@@ -6186,7 +6150,7 @@
     </p:spTree>
     <p:extLst>
       <p:ext uri="{BB962C8B-B14F-4D97-AF65-F5344CB8AC3E}">
-        <p14:creationId xmlns:p14="http://schemas.microsoft.com/office/powerpoint/2010/main" val="3054946635"/>
+        <p14:creationId xmlns:p14="http://schemas.microsoft.com/office/powerpoint/2010/main" val="988992461"/>
       </p:ext>
     </p:extLst>
   </p:cSld>
@@ -6215,13 +6179,7 @@
       </p:grpSpPr>
       <p:sp>
         <p:nvSpPr>
-          <p:cNvPr id="2" name="Title 1">
-            <a:extLst>
-              <a:ext uri="{FF2B5EF4-FFF2-40B4-BE49-F238E27FC236}">
-                <a16:creationId xmlns:a16="http://schemas.microsoft.com/office/drawing/2014/main" id="{8F6F4883-4B0C-4336-A51B-CFE98178716C}"/>
-              </a:ext>
-            </a:extLst>
-          </p:cNvPr>
+          <p:cNvPr id="2" name="Title 1"/>
           <p:cNvSpPr>
             <a:spLocks noGrp="1"/>
           </p:cNvSpPr>
@@ -6236,20 +6194,14 @@
           <a:p>
             <a:r>
               <a:rPr lang="en-GB" dirty="0"/>
-              <a:t>Virtual Environments</a:t>
-            </a:r>
-          </a:p>
-        </p:txBody>
-      </p:sp>
-      <p:sp>
-        <p:nvSpPr>
-          <p:cNvPr id="3" name="Content Placeholder 2">
-            <a:extLst>
-              <a:ext uri="{FF2B5EF4-FFF2-40B4-BE49-F238E27FC236}">
-                <a16:creationId xmlns:a16="http://schemas.microsoft.com/office/drawing/2014/main" id="{E5A4F87B-FE94-4156-8224-3F7B3C38F1F7}"/>
-              </a:ext>
-            </a:extLst>
-          </p:cNvPr>
+              <a:t>Writing Python Code</a:t>
+            </a:r>
+          </a:p>
+        </p:txBody>
+      </p:sp>
+      <p:sp>
+        <p:nvSpPr>
+          <p:cNvPr id="3" name="Content Placeholder 2"/>
           <p:cNvSpPr>
             <a:spLocks noGrp="1"/>
           </p:cNvSpPr>
@@ -6260,85 +6212,80 @@
         <p:spPr/>
         <p:txBody>
           <a:bodyPr>
-            <a:normAutofit lnSpcReduction="10000"/>
+            <a:normAutofit/>
           </a:bodyPr>
           <a:lstStyle/>
           <a:p>
             <a:r>
               <a:rPr lang="en-GB" dirty="0"/>
-              <a:t>Create a self-contained place to install packages and run Python</a:t>
-            </a:r>
-          </a:p>
-          <a:p>
-            <a:pPr lvl="1"/>
-            <a:r>
-              <a:rPr lang="en-GB" dirty="0"/>
-              <a:t>python -m </a:t>
-            </a:r>
+              <a:t>From a terminal via an interactive interpreter</a:t>
+            </a:r>
+          </a:p>
+          <a:p>
+            <a:pPr lvl="1"/>
+            <a:r>
+              <a:rPr lang="en-GB" dirty="0"/>
+              <a:t>Comes with Python </a:t>
+            </a:r>
+          </a:p>
+          <a:p>
+            <a:pPr lvl="1"/>
+            <a:r>
+              <a:rPr lang="en-GB" dirty="0"/>
+              <a:t>Enter commands line by line and see the results immediately</a:t>
+            </a:r>
+          </a:p>
+          <a:p>
+            <a:r>
+              <a:rPr lang="en-GB" dirty="0"/>
+              <a:t>In an IDE</a:t>
+            </a:r>
+          </a:p>
+          <a:p>
+            <a:pPr lvl="1"/>
+            <a:r>
+              <a:rPr lang="en-GB" dirty="0"/>
+              <a:t>IDLE</a:t>
+            </a:r>
+          </a:p>
+          <a:p>
+            <a:pPr lvl="1"/>
             <a:r>
               <a:rPr lang="en-GB" dirty="0" err="1"/>
-              <a:t>venv</a:t>
-            </a:r>
-            <a:r>
-              <a:rPr lang="en-GB" dirty="0"/>
-              <a:t> playground</a:t>
-            </a:r>
-          </a:p>
-          <a:p>
-            <a:r>
-              <a:rPr lang="en-GB" dirty="0"/>
-              <a:t>Invoke the environment</a:t>
-            </a:r>
-          </a:p>
-          <a:p>
-            <a:pPr lvl="1"/>
-            <a:r>
-              <a:rPr lang="en-GB" dirty="0"/>
-              <a:t>playground\scripts\activate.bat      (on Windows)</a:t>
-            </a:r>
-          </a:p>
-          <a:p>
-            <a:pPr lvl="1"/>
-            <a:r>
-              <a:rPr lang="en-GB" dirty="0"/>
-              <a:t>source playground/bin/activate      (on Mac and Linux)</a:t>
-            </a:r>
-          </a:p>
-          <a:p>
-            <a:r>
-              <a:rPr lang="en-GB" dirty="0"/>
-              <a:t>You then have a virtual environment where you can install packages</a:t>
-            </a:r>
-          </a:p>
-          <a:p>
-            <a:pPr lvl="1"/>
-            <a:r>
-              <a:rPr lang="en-GB" dirty="0"/>
-              <a:t>(playground) $ pip list		      (on Mac and Linux)</a:t>
-            </a:r>
-          </a:p>
-          <a:p>
-            <a:pPr lvl="1"/>
-            <a:r>
-              <a:rPr lang="en-GB" dirty="0"/>
-              <a:t>(playground) C:\Python39&gt; pip list (on Windows)</a:t>
-            </a:r>
-          </a:p>
-          <a:p>
-            <a:r>
-              <a:rPr lang="en-GB" dirty="0"/>
-              <a:t>This environment is entirely separate from any other Python installs and packages elsewhere on your system</a:t>
-            </a:r>
-          </a:p>
-          <a:p>
+              <a:t>PyCharm</a:t>
+            </a:r>
             <a:endParaRPr lang="en-GB" dirty="0"/>
+          </a:p>
+          <a:p>
+            <a:r>
+              <a:rPr lang="en-GB" dirty="0"/>
+              <a:t>Anaconda</a:t>
+            </a:r>
+          </a:p>
+          <a:p>
+            <a:r>
+              <a:rPr lang="en-GB" dirty="0" err="1"/>
+              <a:t>IPython</a:t>
+            </a:r>
+            <a:r>
+              <a:rPr lang="en-GB" dirty="0"/>
+              <a:t>/</a:t>
+            </a:r>
+            <a:r>
+              <a:rPr lang="en-GB" dirty="0" err="1"/>
+              <a:t>Jupyter</a:t>
+            </a:r>
+            <a:r>
+              <a:rPr lang="en-GB" dirty="0"/>
+              <a:t> Notebooks</a:t>
+            </a:r>
           </a:p>
         </p:txBody>
       </p:sp>
     </p:spTree>
     <p:extLst>
       <p:ext uri="{BB962C8B-B14F-4D97-AF65-F5344CB8AC3E}">
-        <p14:creationId xmlns:p14="http://schemas.microsoft.com/office/powerpoint/2010/main" val="2616412191"/>
+        <p14:creationId xmlns:p14="http://schemas.microsoft.com/office/powerpoint/2010/main" val="2216851979"/>
       </p:ext>
     </p:extLst>
   </p:cSld>
@@ -6382,7 +6329,7 @@
           <a:p>
             <a:r>
               <a:rPr lang="en-GB" dirty="0"/>
-              <a:t>Python</a:t>
+              <a:t>Adding Python Packages</a:t>
             </a:r>
           </a:p>
         </p:txBody>
@@ -6399,45 +6346,115 @@
         </p:nvSpPr>
         <p:spPr/>
         <p:txBody>
-          <a:bodyPr/>
-          <a:lstStyle/>
-          <a:p>
-            <a:r>
-              <a:rPr lang="en-GB" dirty="0"/>
-              <a:t>Python uses white space to define program structure</a:t>
-            </a:r>
-          </a:p>
-          <a:p>
-            <a:pPr lvl="1"/>
-            <a:r>
-              <a:rPr lang="en-GB" dirty="0"/>
-              <a:t>Usually four spaces for indentation</a:t>
-            </a:r>
-          </a:p>
-          <a:p>
-            <a:r>
-              <a:rPr lang="en-GB" dirty="0"/>
-              <a:t>Comment with #</a:t>
-            </a:r>
-          </a:p>
-          <a:p>
-            <a:r>
-              <a:rPr lang="en-GB" dirty="0"/>
-              <a:t>Continue Lines with \</a:t>
-            </a:r>
-          </a:p>
-          <a:p>
-            <a:r>
-              <a:rPr lang="en-GB" dirty="0"/>
-              <a:t>White-space problems will stop your code working</a:t>
-            </a:r>
+          <a:bodyPr>
+            <a:normAutofit fontScale="92500" lnSpcReduction="20000"/>
+          </a:bodyPr>
+          <a:lstStyle/>
+          <a:p>
+            <a:r>
+              <a:rPr lang="en-GB" dirty="0"/>
+              <a:t>See what’s installed already</a:t>
+            </a:r>
+          </a:p>
+          <a:p>
+            <a:pPr lvl="1"/>
+            <a:r>
+              <a:rPr lang="en-GB" dirty="0"/>
+              <a:t>At a Python prompt, type help() then type modules</a:t>
+            </a:r>
+          </a:p>
+          <a:p>
+            <a:pPr lvl="1"/>
+            <a:r>
+              <a:rPr lang="en-GB" dirty="0"/>
+              <a:t>if Anaconda is installed, type </a:t>
+            </a:r>
+            <a:r>
+              <a:rPr lang="en-GB" dirty="0" err="1"/>
+              <a:t>conda</a:t>
+            </a:r>
+            <a:r>
+              <a:rPr lang="en-GB" dirty="0"/>
+              <a:t> list</a:t>
+            </a:r>
+          </a:p>
+          <a:p>
+            <a:r>
+              <a:rPr lang="en-GB" dirty="0"/>
+              <a:t>Make sure pip is installed</a:t>
+            </a:r>
+          </a:p>
+          <a:p>
+            <a:pPr lvl="1"/>
+            <a:r>
+              <a:rPr lang="en-GB" dirty="0"/>
+              <a:t>At a command prompt type python -m </a:t>
+            </a:r>
+            <a:r>
+              <a:rPr lang="en-GB" dirty="0" err="1"/>
+              <a:t>ensurepip</a:t>
+            </a:r>
+            <a:endParaRPr lang="en-GB" dirty="0"/>
+          </a:p>
+          <a:p>
+            <a:r>
+              <a:rPr lang="en-GB" dirty="0"/>
+              <a:t>Pip might need to be run from the scripts folder</a:t>
+            </a:r>
+          </a:p>
+          <a:p>
+            <a:pPr lvl="1"/>
+            <a:r>
+              <a:rPr lang="en-GB" dirty="0"/>
+              <a:t>E.g. c:/python37/scripts</a:t>
+            </a:r>
+          </a:p>
+          <a:p>
+            <a:r>
+              <a:rPr lang="en-GB" dirty="0"/>
+              <a:t>Add more packages as needed</a:t>
+            </a:r>
+          </a:p>
+          <a:p>
+            <a:pPr lvl="1"/>
+            <a:r>
+              <a:rPr lang="en-GB" dirty="0"/>
+              <a:t>E.g. at a command prompt type python –m pip install </a:t>
+            </a:r>
+            <a:r>
+              <a:rPr lang="en-GB" dirty="0" err="1"/>
+              <a:t>pyperclip</a:t>
+            </a:r>
+            <a:endParaRPr lang="en-GB" dirty="0"/>
+          </a:p>
+          <a:p>
+            <a:r>
+              <a:rPr lang="en-GB" dirty="0"/>
+              <a:t>Many scientific and mathematical packages</a:t>
+            </a:r>
+          </a:p>
+          <a:p>
+            <a:pPr lvl="1"/>
+            <a:r>
+              <a:rPr lang="en-GB" dirty="0" err="1"/>
+              <a:t>NumPy</a:t>
+            </a:r>
+            <a:endParaRPr lang="en-GB" dirty="0"/>
+          </a:p>
+          <a:p>
+            <a:pPr lvl="1"/>
+            <a:r>
+              <a:rPr lang="en-GB" dirty="0" err="1"/>
+              <a:t>SciPy</a:t>
+            </a:r>
+            <a:endParaRPr lang="en-GB" dirty="0"/>
           </a:p>
         </p:txBody>
       </p:sp>
     </p:spTree>
     <p:extLst>
       <p:ext uri="{BB962C8B-B14F-4D97-AF65-F5344CB8AC3E}">
-        <p14:creationId xmlns:p14="http://schemas.microsoft.com/office/powerpoint/2010/main" val="1418890894"/>
+        <p14:creationId xmlns:p14="http://schemas.microsoft.com/office/powerpoint/2010/main" val="3054946635"/>
       </p:ext>
     </p:extLst>
   </p:cSld>
@@ -6466,7 +6483,13 @@
       </p:grpSpPr>
       <p:sp>
         <p:nvSpPr>
-          <p:cNvPr id="2" name="Title 1"/>
+          <p:cNvPr id="2" name="Title 1">
+            <a:extLst>
+              <a:ext uri="{FF2B5EF4-FFF2-40B4-BE49-F238E27FC236}">
+                <a16:creationId xmlns:a16="http://schemas.microsoft.com/office/drawing/2014/main" id="{8F6F4883-4B0C-4336-A51B-CFE98178716C}"/>
+              </a:ext>
+            </a:extLst>
+          </p:cNvPr>
           <p:cNvSpPr>
             <a:spLocks noGrp="1"/>
           </p:cNvSpPr>
@@ -6481,14 +6504,20 @@
           <a:p>
             <a:r>
               <a:rPr lang="en-GB" dirty="0"/>
-              <a:t>Code Structures</a:t>
-            </a:r>
-          </a:p>
-        </p:txBody>
-      </p:sp>
-      <p:sp>
-        <p:nvSpPr>
-          <p:cNvPr id="3" name="Content Placeholder 2"/>
+              <a:t>Virtual Environments</a:t>
+            </a:r>
+          </a:p>
+        </p:txBody>
+      </p:sp>
+      <p:sp>
+        <p:nvSpPr>
+          <p:cNvPr id="3" name="Content Placeholder 2">
+            <a:extLst>
+              <a:ext uri="{FF2B5EF4-FFF2-40B4-BE49-F238E27FC236}">
+                <a16:creationId xmlns:a16="http://schemas.microsoft.com/office/drawing/2014/main" id="{E5A4F87B-FE94-4156-8224-3F7B3C38F1F7}"/>
+              </a:ext>
+            </a:extLst>
+          </p:cNvPr>
           <p:cNvSpPr>
             <a:spLocks noGrp="1"/>
           </p:cNvSpPr>
@@ -6498,26 +6527,86 @@
         </p:nvSpPr>
         <p:spPr/>
         <p:txBody>
-          <a:bodyPr/>
-          <a:lstStyle/>
-          <a:p>
-            <a:r>
-              <a:rPr lang="en-GB" dirty="0"/>
-              <a:t>Indentation and colon</a:t>
-            </a:r>
-          </a:p>
-          <a:p>
-            <a:r>
-              <a:rPr lang="en-GB" dirty="0"/>
-              <a:t>Loops and conditionals</a:t>
-            </a:r>
+          <a:bodyPr>
+            <a:normAutofit lnSpcReduction="10000"/>
+          </a:bodyPr>
+          <a:lstStyle/>
+          <a:p>
+            <a:r>
+              <a:rPr lang="en-GB" dirty="0"/>
+              <a:t>Create a self-contained place to install packages and run Python</a:t>
+            </a:r>
+          </a:p>
+          <a:p>
+            <a:pPr lvl="1"/>
+            <a:r>
+              <a:rPr lang="en-GB" dirty="0"/>
+              <a:t>python -m </a:t>
+            </a:r>
+            <a:r>
+              <a:rPr lang="en-GB" dirty="0" err="1"/>
+              <a:t>venv</a:t>
+            </a:r>
+            <a:r>
+              <a:rPr lang="en-GB" dirty="0"/>
+              <a:t> playground</a:t>
+            </a:r>
+          </a:p>
+          <a:p>
+            <a:r>
+              <a:rPr lang="en-GB" dirty="0"/>
+              <a:t>Invoke the environment</a:t>
+            </a:r>
+          </a:p>
+          <a:p>
+            <a:pPr lvl="1"/>
+            <a:r>
+              <a:rPr lang="en-GB" dirty="0"/>
+              <a:t>playground\scripts\activate.bat      (on Windows)</a:t>
+            </a:r>
+          </a:p>
+          <a:p>
+            <a:pPr lvl="1"/>
+            <a:r>
+              <a:rPr lang="en-GB" dirty="0"/>
+              <a:t>source playground/bin/activate      (on Mac and Linux)</a:t>
+            </a:r>
+          </a:p>
+          <a:p>
+            <a:r>
+              <a:rPr lang="en-GB" dirty="0"/>
+              <a:t>You then have a virtual environment where you can install packages</a:t>
+            </a:r>
+          </a:p>
+          <a:p>
+            <a:pPr lvl="1"/>
+            <a:r>
+              <a:rPr lang="en-GB" dirty="0"/>
+              <a:t>(playground) $ pip list		      (on Mac and Linux)</a:t>
+            </a:r>
+          </a:p>
+          <a:p>
+            <a:pPr lvl="1"/>
+            <a:r>
+              <a:rPr lang="en-GB" dirty="0"/>
+              <a:t>(playground) C:\Python39&gt; pip list (on Windows)</a:t>
+            </a:r>
+          </a:p>
+          <a:p>
+            <a:r>
+              <a:rPr lang="en-GB" dirty="0"/>
+              <a:t>This environment is entirely separate from any other Python installs and packages elsewhere on your system</a:t>
+            </a:r>
+          </a:p>
+          <a:p>
+            <a:endParaRPr lang="en-GB" dirty="0"/>
           </a:p>
         </p:txBody>
       </p:sp>
     </p:spTree>
     <p:extLst>
       <p:ext uri="{BB962C8B-B14F-4D97-AF65-F5344CB8AC3E}">
-        <p14:creationId xmlns:p14="http://schemas.microsoft.com/office/powerpoint/2010/main" val="3272210946"/>
+        <p14:creationId xmlns:p14="http://schemas.microsoft.com/office/powerpoint/2010/main" val="2616412191"/>
       </p:ext>
     </p:extLst>
   </p:cSld>
@@ -6561,7 +6650,7 @@
           <a:p>
             <a:r>
               <a:rPr lang="en-GB" dirty="0"/>
-              <a:t>Running Programs</a:t>
+              <a:t>Python</a:t>
             </a:r>
           </a:p>
         </p:txBody>
@@ -6578,107 +6667,37 @@
         </p:nvSpPr>
         <p:spPr/>
         <p:txBody>
-          <a:bodyPr>
-            <a:normAutofit lnSpcReduction="10000"/>
-          </a:bodyPr>
-          <a:lstStyle/>
-          <a:p>
-            <a:r>
-              <a:rPr lang="en-GB" dirty="0"/>
-              <a:t>Can include a shebang line at the top of the script to tell the operating system where to locate the correct Python interpreter</a:t>
-            </a:r>
-          </a:p>
-          <a:p>
-            <a:pPr lvl="1"/>
-            <a:r>
-              <a:rPr lang="en-GB" dirty="0"/>
-              <a:t>#! /</a:t>
-            </a:r>
-            <a:r>
-              <a:rPr lang="en-GB" dirty="0" err="1"/>
-              <a:t>usr</a:t>
-            </a:r>
-            <a:r>
-              <a:rPr lang="en-GB" dirty="0"/>
-              <a:t>/bin/python3	- </a:t>
-            </a:r>
-            <a:r>
-              <a:rPr lang="en-GB" dirty="0" err="1"/>
-              <a:t>linux</a:t>
-            </a:r>
-            <a:endParaRPr lang="en-GB" dirty="0"/>
-          </a:p>
-          <a:p>
-            <a:r>
-              <a:rPr lang="en-GB" dirty="0"/>
-              <a:t>Save the </a:t>
-            </a:r>
-            <a:r>
-              <a:rPr lang="en-GB" i="1" dirty="0"/>
-              <a:t>.</a:t>
-            </a:r>
-            <a:r>
-              <a:rPr lang="en-GB" i="1" dirty="0" err="1"/>
-              <a:t>py</a:t>
-            </a:r>
-            <a:r>
-              <a:rPr lang="en-GB" i="1" dirty="0"/>
-              <a:t> </a:t>
-            </a:r>
-            <a:r>
-              <a:rPr lang="en-GB" dirty="0"/>
-              <a:t>file to a home folder </a:t>
-            </a:r>
-          </a:p>
-          <a:p>
-            <a:r>
-              <a:rPr lang="en-GB" dirty="0"/>
-              <a:t>Change the file permissions to make it executable:</a:t>
-            </a:r>
-          </a:p>
-          <a:p>
-            <a:pPr lvl="1"/>
-            <a:r>
-              <a:rPr lang="en-GB" dirty="0" err="1"/>
-              <a:t>chmod</a:t>
-            </a:r>
-            <a:r>
-              <a:rPr lang="en-GB" dirty="0"/>
-              <a:t> +x pythonScript.py</a:t>
-            </a:r>
-          </a:p>
-          <a:p>
-            <a:r>
-              <a:rPr lang="en-GB" dirty="0"/>
-              <a:t>Run your script from a Terminal window:</a:t>
-            </a:r>
-          </a:p>
-          <a:p>
-            <a:pPr lvl="1"/>
-            <a:r>
-              <a:rPr lang="en-GB" dirty="0"/>
-              <a:t>./pythonScript.py</a:t>
-            </a:r>
-          </a:p>
-          <a:p>
-            <a:r>
-              <a:rPr lang="en-GB" dirty="0"/>
-              <a:t>Open a program in the interactive interpreter</a:t>
-            </a:r>
-          </a:p>
-          <a:p>
-            <a:pPr lvl="1"/>
-            <a:r>
-              <a:rPr lang="en-GB" dirty="0"/>
-              <a:t>python -</a:t>
-            </a:r>
-            <a:r>
-              <a:rPr lang="en-GB" dirty="0" err="1"/>
-              <a:t>i</a:t>
-            </a:r>
-            <a:r>
-              <a:rPr lang="en-GB" dirty="0"/>
-              <a:t> filename.py</a:t>
+          <a:bodyPr/>
+          <a:lstStyle/>
+          <a:p>
+            <a:r>
+              <a:rPr lang="en-GB" dirty="0"/>
+              <a:t>Python uses white space to define program structure</a:t>
+            </a:r>
+          </a:p>
+          <a:p>
+            <a:pPr lvl="1"/>
+            <a:r>
+              <a:rPr lang="en-GB" dirty="0"/>
+              <a:t>Usually four spaces for indentation</a:t>
+            </a:r>
+          </a:p>
+          <a:p>
+            <a:r>
+              <a:rPr lang="en-GB" dirty="0"/>
+              <a:t>Comment with #</a:t>
+            </a:r>
+          </a:p>
+          <a:p>
+            <a:r>
+              <a:rPr lang="en-GB" dirty="0"/>
+              <a:t>Continue Lines with \</a:t>
+            </a:r>
+          </a:p>
+          <a:p>
+            <a:r>
+              <a:rPr lang="en-GB" dirty="0"/>
+              <a:t>White-space problems will stop your code working</a:t>
             </a:r>
           </a:p>
         </p:txBody>
@@ -6686,7 +6705,7 @@
     </p:spTree>
     <p:extLst>
       <p:ext uri="{BB962C8B-B14F-4D97-AF65-F5344CB8AC3E}">
-        <p14:creationId xmlns:p14="http://schemas.microsoft.com/office/powerpoint/2010/main" val="3082202807"/>
+        <p14:creationId xmlns:p14="http://schemas.microsoft.com/office/powerpoint/2010/main" val="1418890894"/>
       </p:ext>
     </p:extLst>
   </p:cSld>
@@ -6730,7 +6749,7 @@
           <a:p>
             <a:r>
               <a:rPr lang="en-GB" dirty="0"/>
-              <a:t>Comprehensions</a:t>
+              <a:t>Code Structures</a:t>
             </a:r>
           </a:p>
         </p:txBody>
@@ -6752,13 +6771,13 @@
           <a:p>
             <a:r>
               <a:rPr lang="en-GB" dirty="0"/>
-              <a:t>A comprehension is a compact way to create a data structure from one or more iterators</a:t>
-            </a:r>
-          </a:p>
-          <a:p>
-            <a:r>
-              <a:rPr lang="en-GB" dirty="0"/>
-              <a:t>Comprehensions make it possible to combine loops and conditional tests with less verbose syntax</a:t>
+              <a:t>Indentation and colon</a:t>
+            </a:r>
+          </a:p>
+          <a:p>
+            <a:r>
+              <a:rPr lang="en-GB" dirty="0"/>
+              <a:t>Loops and conditionals</a:t>
             </a:r>
           </a:p>
         </p:txBody>
@@ -6766,7 +6785,7 @@
     </p:spTree>
     <p:extLst>
       <p:ext uri="{BB962C8B-B14F-4D97-AF65-F5344CB8AC3E}">
-        <p14:creationId xmlns:p14="http://schemas.microsoft.com/office/powerpoint/2010/main" val="1445240660"/>
+        <p14:creationId xmlns:p14="http://schemas.microsoft.com/office/powerpoint/2010/main" val="3272210946"/>
       </p:ext>
     </p:extLst>
   </p:cSld>
@@ -6810,7 +6829,7 @@
           <a:p>
             <a:r>
               <a:rPr lang="en-GB" dirty="0"/>
-              <a:t>Comprehensions</a:t>
+              <a:t>Running Programs</a:t>
             </a:r>
           </a:p>
         </p:txBody>
@@ -6827,38 +6846,107 @@
         </p:nvSpPr>
         <p:spPr/>
         <p:txBody>
-          <a:bodyPr/>
-          <a:lstStyle/>
-          <a:p>
-            <a:r>
-              <a:rPr lang="en-GB" dirty="0"/>
-              <a:t>List Comprehension</a:t>
-            </a:r>
-          </a:p>
-          <a:p>
-            <a:r>
-              <a:rPr lang="en-GB" dirty="0"/>
-              <a:t>Dictionary Comprehension</a:t>
-            </a:r>
-          </a:p>
-          <a:p>
-            <a:r>
-              <a:rPr lang="en-GB" dirty="0"/>
-              <a:t>Generators</a:t>
-            </a:r>
-          </a:p>
-          <a:p>
-            <a:pPr lvl="1"/>
-            <a:r>
-              <a:rPr lang="en-GB" dirty="0"/>
-              <a:t>range</a:t>
-            </a:r>
-          </a:p>
-          <a:p>
-            <a:pPr lvl="1"/>
-            <a:r>
-              <a:rPr lang="en-GB" dirty="0"/>
-              <a:t>generator functions</a:t>
+          <a:bodyPr>
+            <a:normAutofit lnSpcReduction="10000"/>
+          </a:bodyPr>
+          <a:lstStyle/>
+          <a:p>
+            <a:r>
+              <a:rPr lang="en-GB" dirty="0"/>
+              <a:t>Can include a shebang line at the top of the script to tell the operating system where to locate the correct Python interpreter</a:t>
+            </a:r>
+          </a:p>
+          <a:p>
+            <a:pPr lvl="1"/>
+            <a:r>
+              <a:rPr lang="en-GB" dirty="0"/>
+              <a:t>#! /</a:t>
+            </a:r>
+            <a:r>
+              <a:rPr lang="en-GB" dirty="0" err="1"/>
+              <a:t>usr</a:t>
+            </a:r>
+            <a:r>
+              <a:rPr lang="en-GB" dirty="0"/>
+              <a:t>/bin/python3	- </a:t>
+            </a:r>
+            <a:r>
+              <a:rPr lang="en-GB" dirty="0" err="1"/>
+              <a:t>linux</a:t>
+            </a:r>
+            <a:endParaRPr lang="en-GB" dirty="0"/>
+          </a:p>
+          <a:p>
+            <a:r>
+              <a:rPr lang="en-GB" dirty="0"/>
+              <a:t>Save the </a:t>
+            </a:r>
+            <a:r>
+              <a:rPr lang="en-GB" i="1" dirty="0"/>
+              <a:t>.</a:t>
+            </a:r>
+            <a:r>
+              <a:rPr lang="en-GB" i="1" dirty="0" err="1"/>
+              <a:t>py</a:t>
+            </a:r>
+            <a:r>
+              <a:rPr lang="en-GB" i="1" dirty="0"/>
+              <a:t> </a:t>
+            </a:r>
+            <a:r>
+              <a:rPr lang="en-GB" dirty="0"/>
+              <a:t>file to a home folder </a:t>
+            </a:r>
+          </a:p>
+          <a:p>
+            <a:r>
+              <a:rPr lang="en-GB" dirty="0"/>
+              <a:t>Change the file permissions to make it executable:</a:t>
+            </a:r>
+          </a:p>
+          <a:p>
+            <a:pPr lvl="1"/>
+            <a:r>
+              <a:rPr lang="en-GB" dirty="0" err="1"/>
+              <a:t>chmod</a:t>
+            </a:r>
+            <a:r>
+              <a:rPr lang="en-GB" dirty="0"/>
+              <a:t> +x pythonScript.py</a:t>
+            </a:r>
+          </a:p>
+          <a:p>
+            <a:r>
+              <a:rPr lang="en-GB" dirty="0"/>
+              <a:t>Run your script from a Terminal window:</a:t>
+            </a:r>
+          </a:p>
+          <a:p>
+            <a:pPr lvl="1"/>
+            <a:r>
+              <a:rPr lang="en-GB" dirty="0"/>
+              <a:t>./pythonScript.py</a:t>
+            </a:r>
+          </a:p>
+          <a:p>
+            <a:r>
+              <a:rPr lang="en-GB" dirty="0"/>
+              <a:t>Open a program in the interactive interpreter</a:t>
+            </a:r>
+          </a:p>
+          <a:p>
+            <a:pPr lvl="1"/>
+            <a:r>
+              <a:rPr lang="en-GB" dirty="0"/>
+              <a:t>python -</a:t>
+            </a:r>
+            <a:r>
+              <a:rPr lang="en-GB" dirty="0" err="1"/>
+              <a:t>i</a:t>
+            </a:r>
+            <a:r>
+              <a:rPr lang="en-GB" dirty="0"/>
+              <a:t> filename.py</a:t>
             </a:r>
           </a:p>
         </p:txBody>
@@ -6866,7 +6954,7 @@
     </p:spTree>
     <p:extLst>
       <p:ext uri="{BB962C8B-B14F-4D97-AF65-F5344CB8AC3E}">
-        <p14:creationId xmlns:p14="http://schemas.microsoft.com/office/powerpoint/2010/main" val="241710040"/>
+        <p14:creationId xmlns:p14="http://schemas.microsoft.com/office/powerpoint/2010/main" val="3082202807"/>
       </p:ext>
     </p:extLst>
   </p:cSld>
@@ -6910,13 +6998,8 @@
           <a:p>
             <a:r>
               <a:rPr lang="en-GB" dirty="0"/>
-              <a:t>Scope and </a:t>
-            </a:r>
-            <a:r>
-              <a:rPr lang="en-GB" dirty="0" err="1"/>
-              <a:t>namespacing</a:t>
-            </a:r>
-            <a:endParaRPr lang="en-GB" dirty="0"/>
+              <a:t>Comprehensions</a:t>
+            </a:r>
           </a:p>
         </p:txBody>
       </p:sp>
@@ -6937,44 +7020,13 @@
           <a:p>
             <a:r>
               <a:rPr lang="en-GB" dirty="0"/>
-              <a:t>There is always a global scope</a:t>
-            </a:r>
-          </a:p>
-          <a:p>
-            <a:r>
-              <a:rPr lang="en-GB" dirty="0"/>
-              <a:t>Every code block creates it’s own scope</a:t>
-            </a:r>
-          </a:p>
-          <a:p>
-            <a:r>
-              <a:rPr lang="en-GB" dirty="0"/>
-              <a:t>Must state which </a:t>
-            </a:r>
-            <a:r>
-              <a:rPr lang="en-GB" dirty="0" err="1"/>
-              <a:t>globals</a:t>
-            </a:r>
-            <a:r>
-              <a:rPr lang="en-GB" dirty="0"/>
-              <a:t> will be available within another scope</a:t>
-            </a:r>
-          </a:p>
-          <a:p>
-            <a:pPr lvl="1"/>
-            <a:r>
-              <a:rPr lang="en-GB" dirty="0"/>
-              <a:t>Use global keyword</a:t>
-            </a:r>
-          </a:p>
-          <a:p>
-            <a:r>
-              <a:rPr lang="en-GB" dirty="0" err="1"/>
-              <a:t>globals</a:t>
-            </a:r>
-            <a:r>
-              <a:rPr lang="en-GB" dirty="0"/>
-              <a:t>() and locals() dictionaries</a:t>
+              <a:t>A comprehension is a compact way to create a data structure from one or more iterators</a:t>
+            </a:r>
+          </a:p>
+          <a:p>
+            <a:r>
+              <a:rPr lang="en-GB" dirty="0"/>
+              <a:t>Comprehensions make it possible to combine loops and conditional tests with less verbose syntax</a:t>
             </a:r>
           </a:p>
         </p:txBody>
@@ -6982,7 +7034,7 @@
     </p:spTree>
     <p:extLst>
       <p:ext uri="{BB962C8B-B14F-4D97-AF65-F5344CB8AC3E}">
-        <p14:creationId xmlns:p14="http://schemas.microsoft.com/office/powerpoint/2010/main" val="2815516987"/>
+        <p14:creationId xmlns:p14="http://schemas.microsoft.com/office/powerpoint/2010/main" val="1445240660"/>
       </p:ext>
     </p:extLst>
   </p:cSld>
@@ -7110,44 +7162,73 @@
             <a:spLocks noGrp="1"/>
           </p:cNvSpPr>
           <p:nvPr>
-            <p:ph type="ctrTitle"/>
-          </p:nvPr>
-        </p:nvSpPr>
-        <p:spPr/>
-        <p:txBody>
-          <a:bodyPr/>
-          <a:lstStyle/>
-          <a:p>
-            <a:r>
-              <a:rPr lang="en-GB" dirty="0"/>
-              <a:t>Creating Programs and Modules</a:t>
-            </a:r>
-          </a:p>
-        </p:txBody>
-      </p:sp>
-      <p:sp>
-        <p:nvSpPr>
-          <p:cNvPr id="4" name="Subtitle 3"/>
-          <p:cNvSpPr>
-            <a:spLocks noGrp="1"/>
-          </p:cNvSpPr>
-          <p:nvPr>
-            <p:ph type="subTitle" idx="1"/>
-          </p:nvPr>
-        </p:nvSpPr>
-        <p:spPr/>
-        <p:txBody>
-          <a:bodyPr/>
-          <a:lstStyle/>
-          <a:p>
-            <a:endParaRPr lang="en-GB"/>
+            <p:ph type="title"/>
+          </p:nvPr>
+        </p:nvSpPr>
+        <p:spPr/>
+        <p:txBody>
+          <a:bodyPr/>
+          <a:lstStyle/>
+          <a:p>
+            <a:r>
+              <a:rPr lang="en-GB" dirty="0"/>
+              <a:t>Comprehensions</a:t>
+            </a:r>
+          </a:p>
+        </p:txBody>
+      </p:sp>
+      <p:sp>
+        <p:nvSpPr>
+          <p:cNvPr id="3" name="Content Placeholder 2"/>
+          <p:cNvSpPr>
+            <a:spLocks noGrp="1"/>
+          </p:cNvSpPr>
+          <p:nvPr>
+            <p:ph idx="1"/>
+          </p:nvPr>
+        </p:nvSpPr>
+        <p:spPr/>
+        <p:txBody>
+          <a:bodyPr/>
+          <a:lstStyle/>
+          <a:p>
+            <a:r>
+              <a:rPr lang="en-GB" dirty="0"/>
+              <a:t>List Comprehension</a:t>
+            </a:r>
+          </a:p>
+          <a:p>
+            <a:r>
+              <a:rPr lang="en-GB" dirty="0"/>
+              <a:t>Dictionary Comprehension</a:t>
+            </a:r>
+          </a:p>
+          <a:p>
+            <a:r>
+              <a:rPr lang="en-GB" dirty="0"/>
+              <a:t>Generators</a:t>
+            </a:r>
+          </a:p>
+          <a:p>
+            <a:pPr lvl="1"/>
+            <a:r>
+              <a:rPr lang="en-GB" dirty="0"/>
+              <a:t>range</a:t>
+            </a:r>
+          </a:p>
+          <a:p>
+            <a:pPr lvl="1"/>
+            <a:r>
+              <a:rPr lang="en-GB" dirty="0"/>
+              <a:t>generator functions</a:t>
+            </a:r>
           </a:p>
         </p:txBody>
       </p:sp>
     </p:spTree>
     <p:extLst>
       <p:ext uri="{BB962C8B-B14F-4D97-AF65-F5344CB8AC3E}">
-        <p14:creationId xmlns:p14="http://schemas.microsoft.com/office/powerpoint/2010/main" val="1010615451"/>
+        <p14:creationId xmlns:p14="http://schemas.microsoft.com/office/powerpoint/2010/main" val="241710040"/>
       </p:ext>
     </p:extLst>
   </p:cSld>
@@ -7191,8 +7272,13 @@
           <a:p>
             <a:r>
               <a:rPr lang="en-GB" dirty="0"/>
-              <a:t>The Python Standard Library</a:t>
-            </a:r>
+              <a:t>Scope and </a:t>
+            </a:r>
+            <a:r>
+              <a:rPr lang="en-GB" dirty="0" err="1"/>
+              <a:t>namespacing</a:t>
+            </a:r>
+            <a:endParaRPr lang="en-GB" dirty="0"/>
           </a:p>
         </p:txBody>
       </p:sp>
@@ -7213,7 +7299,44 @@
           <a:p>
             <a:r>
               <a:rPr lang="en-GB" dirty="0"/>
-              <a:t>https://docs.python.org/3/library/</a:t>
+              <a:t>There is always a global scope</a:t>
+            </a:r>
+          </a:p>
+          <a:p>
+            <a:r>
+              <a:rPr lang="en-GB" dirty="0"/>
+              <a:t>Every code block creates it’s own scope</a:t>
+            </a:r>
+          </a:p>
+          <a:p>
+            <a:r>
+              <a:rPr lang="en-GB" dirty="0"/>
+              <a:t>Must state which </a:t>
+            </a:r>
+            <a:r>
+              <a:rPr lang="en-GB" dirty="0" err="1"/>
+              <a:t>globals</a:t>
+            </a:r>
+            <a:r>
+              <a:rPr lang="en-GB" dirty="0"/>
+              <a:t> will be available within another scope</a:t>
+            </a:r>
+          </a:p>
+          <a:p>
+            <a:pPr lvl="1"/>
+            <a:r>
+              <a:rPr lang="en-GB" dirty="0"/>
+              <a:t>Use global keyword</a:t>
+            </a:r>
+          </a:p>
+          <a:p>
+            <a:r>
+              <a:rPr lang="en-GB" dirty="0" err="1"/>
+              <a:t>globals</a:t>
+            </a:r>
+            <a:r>
+              <a:rPr lang="en-GB" dirty="0"/>
+              <a:t>() and locals() dictionaries</a:t>
             </a:r>
           </a:p>
         </p:txBody>
@@ -7221,7 +7344,7 @@
     </p:spTree>
     <p:extLst>
       <p:ext uri="{BB962C8B-B14F-4D97-AF65-F5344CB8AC3E}">
-        <p14:creationId xmlns:p14="http://schemas.microsoft.com/office/powerpoint/2010/main" val="1534625840"/>
+        <p14:creationId xmlns:p14="http://schemas.microsoft.com/office/powerpoint/2010/main" val="2815516987"/>
       </p:ext>
     </p:extLst>
   </p:cSld>
@@ -7255,59 +7378,44 @@
             <a:spLocks noGrp="1"/>
           </p:cNvSpPr>
           <p:nvPr>
-            <p:ph type="title"/>
-          </p:nvPr>
-        </p:nvSpPr>
-        <p:spPr/>
-        <p:txBody>
-          <a:bodyPr/>
-          <a:lstStyle/>
-          <a:p>
-            <a:r>
-              <a:rPr lang="en-GB" dirty="0"/>
-              <a:t>Functions</a:t>
-            </a:r>
-          </a:p>
-        </p:txBody>
-      </p:sp>
-      <p:sp>
-        <p:nvSpPr>
-          <p:cNvPr id="3" name="Content Placeholder 2"/>
-          <p:cNvSpPr>
-            <a:spLocks noGrp="1"/>
-          </p:cNvSpPr>
-          <p:nvPr>
-            <p:ph idx="1"/>
-          </p:nvPr>
-        </p:nvSpPr>
-        <p:spPr/>
-        <p:txBody>
-          <a:bodyPr/>
-          <a:lstStyle/>
-          <a:p>
-            <a:r>
-              <a:rPr lang="en-GB" dirty="0"/>
-              <a:t>Define and call</a:t>
-            </a:r>
-          </a:p>
-          <a:p>
-            <a:r>
-              <a:rPr lang="en-GB" dirty="0"/>
-              <a:t>Optional parameters</a:t>
-            </a:r>
-          </a:p>
-          <a:p>
-            <a:r>
-              <a:rPr lang="en-GB" dirty="0"/>
-              <a:t>Return value (or None)</a:t>
-            </a:r>
+            <p:ph type="ctrTitle"/>
+          </p:nvPr>
+        </p:nvSpPr>
+        <p:spPr/>
+        <p:txBody>
+          <a:bodyPr/>
+          <a:lstStyle/>
+          <a:p>
+            <a:r>
+              <a:rPr lang="en-GB" dirty="0"/>
+              <a:t>Creating Programs and Modules</a:t>
+            </a:r>
+          </a:p>
+        </p:txBody>
+      </p:sp>
+      <p:sp>
+        <p:nvSpPr>
+          <p:cNvPr id="4" name="Subtitle 3"/>
+          <p:cNvSpPr>
+            <a:spLocks noGrp="1"/>
+          </p:cNvSpPr>
+          <p:nvPr>
+            <p:ph type="subTitle" idx="1"/>
+          </p:nvPr>
+        </p:nvSpPr>
+        <p:spPr/>
+        <p:txBody>
+          <a:bodyPr/>
+          <a:lstStyle/>
+          <a:p>
+            <a:endParaRPr lang="en-GB"/>
           </a:p>
         </p:txBody>
       </p:sp>
     </p:spTree>
     <p:extLst>
       <p:ext uri="{BB962C8B-B14F-4D97-AF65-F5344CB8AC3E}">
-        <p14:creationId xmlns:p14="http://schemas.microsoft.com/office/powerpoint/2010/main" val="1925968434"/>
+        <p14:creationId xmlns:p14="http://schemas.microsoft.com/office/powerpoint/2010/main" val="1010615451"/>
       </p:ext>
     </p:extLst>
   </p:cSld>
@@ -7351,7 +7459,7 @@
           <a:p>
             <a:r>
               <a:rPr lang="en-GB" dirty="0"/>
-              <a:t>Basic inheritance</a:t>
+              <a:t>The Python Standard Library</a:t>
             </a:r>
           </a:p>
         </p:txBody>
@@ -7373,19 +7481,7 @@
           <a:p>
             <a:r>
               <a:rPr lang="en-GB" dirty="0"/>
-              <a:t>Every class we create uses inheritance</a:t>
-            </a:r>
-          </a:p>
-          <a:p>
-            <a:r>
-              <a:rPr lang="en-GB" dirty="0"/>
-              <a:t>All Python classes are subclasses of the object class</a:t>
-            </a:r>
-          </a:p>
-          <a:p>
-            <a:r>
-              <a:rPr lang="en-GB" dirty="0"/>
-              <a:t>If we don't explicitly inherit from a different class, classes will automatically inherit from object </a:t>
+              <a:t>https://docs.python.org/3/library/</a:t>
             </a:r>
           </a:p>
         </p:txBody>
@@ -7393,7 +7489,7 @@
     </p:spTree>
     <p:extLst>
       <p:ext uri="{BB962C8B-B14F-4D97-AF65-F5344CB8AC3E}">
-        <p14:creationId xmlns:p14="http://schemas.microsoft.com/office/powerpoint/2010/main" val="158887076"/>
+        <p14:creationId xmlns:p14="http://schemas.microsoft.com/office/powerpoint/2010/main" val="1534625840"/>
       </p:ext>
     </p:extLst>
   </p:cSld>
@@ -7437,15 +7533,7 @@
           <a:p>
             <a:r>
               <a:rPr lang="en-GB" dirty="0"/>
-              <a:t>**</a:t>
-            </a:r>
-            <a:r>
-              <a:rPr lang="en-GB" dirty="0" err="1"/>
-              <a:t>kwargs</a:t>
-            </a:r>
-            <a:r>
-              <a:rPr lang="en-GB" dirty="0"/>
-              <a:t> syntax</a:t>
+              <a:t>Functions</a:t>
             </a:r>
           </a:p>
         </p:txBody>
@@ -7467,74 +7555,27 @@
           <a:p>
             <a:r>
               <a:rPr lang="en-GB" dirty="0"/>
-              <a:t>Collects any keyword arguments passed into the method that were not explicitly listed in the parameter list</a:t>
-            </a:r>
-          </a:p>
-          <a:p>
-            <a:r>
-              <a:rPr lang="en-GB" dirty="0"/>
-              <a:t>These arguments are stored in a dictionary named </a:t>
-            </a:r>
-            <a:r>
-              <a:rPr lang="en-GB" dirty="0" err="1"/>
-              <a:t>kwargs</a:t>
-            </a:r>
-            <a:r>
-              <a:rPr lang="en-GB" dirty="0"/>
-              <a:t> </a:t>
-            </a:r>
-          </a:p>
-          <a:p>
-            <a:pPr lvl="1"/>
-            <a:r>
-              <a:rPr lang="en-GB" dirty="0"/>
-              <a:t>Can call the variable whatever we like, </a:t>
-            </a:r>
-            <a:r>
-              <a:rPr lang="en-GB" dirty="0" err="1"/>
-              <a:t>conventionionally</a:t>
-            </a:r>
-            <a:r>
-              <a:rPr lang="en-GB" dirty="0"/>
-              <a:t> </a:t>
-            </a:r>
-            <a:r>
-              <a:rPr lang="en-GB" dirty="0" err="1"/>
-              <a:t>kwargs</a:t>
-            </a:r>
-            <a:endParaRPr lang="en-GB" dirty="0"/>
-          </a:p>
-          <a:p>
-            <a:r>
-              <a:rPr lang="en-GB" dirty="0"/>
-              <a:t>When we call a different method (e.g. super().__</a:t>
-            </a:r>
-            <a:r>
-              <a:rPr lang="en-GB" dirty="0" err="1"/>
-              <a:t>init</a:t>
-            </a:r>
-            <a:r>
-              <a:rPr lang="en-GB" dirty="0"/>
-              <a:t>__) with a **</a:t>
-            </a:r>
-            <a:r>
-              <a:rPr lang="en-GB" dirty="0" err="1"/>
-              <a:t>kwargs</a:t>
-            </a:r>
-            <a:r>
-              <a:rPr lang="en-GB" dirty="0"/>
-              <a:t> syntax, it unpacks the dictionary and passes the results to the method as normal keyword arguments 	</a:t>
-            </a:r>
-          </a:p>
-          <a:p>
-            <a:endParaRPr lang="en-GB" dirty="0"/>
+              <a:t>Define and call</a:t>
+            </a:r>
+          </a:p>
+          <a:p>
+            <a:r>
+              <a:rPr lang="en-GB" dirty="0"/>
+              <a:t>Optional parameters</a:t>
+            </a:r>
+          </a:p>
+          <a:p>
+            <a:r>
+              <a:rPr lang="en-GB" dirty="0"/>
+              <a:t>Return value (or None)</a:t>
+            </a:r>
           </a:p>
         </p:txBody>
       </p:sp>
     </p:spTree>
     <p:extLst>
       <p:ext uri="{BB962C8B-B14F-4D97-AF65-F5344CB8AC3E}">
-        <p14:creationId xmlns:p14="http://schemas.microsoft.com/office/powerpoint/2010/main" val="2574568833"/>
+        <p14:creationId xmlns:p14="http://schemas.microsoft.com/office/powerpoint/2010/main" val="1925968434"/>
       </p:ext>
     </p:extLst>
   </p:cSld>
@@ -7578,7 +7619,7 @@
           <a:p>
             <a:r>
               <a:rPr lang="en-GB" dirty="0"/>
-              <a:t>methods go in classes, which go in modules, which go in packages </a:t>
+              <a:t>Basic inheritance</a:t>
             </a:r>
           </a:p>
         </p:txBody>
@@ -7600,13 +7641,19 @@
           <a:p>
             <a:r>
               <a:rPr lang="en-GB" dirty="0"/>
-              <a:t>Classes can be defined anywhere</a:t>
-            </a:r>
-          </a:p>
-          <a:p>
-            <a:r>
-              <a:rPr lang="en-GB" dirty="0"/>
-              <a:t>They are typically defined at the module level, but they can also be defined inside a function or method </a:t>
+              <a:t>Every class we create uses inheritance</a:t>
+            </a:r>
+          </a:p>
+          <a:p>
+            <a:r>
+              <a:rPr lang="en-GB" dirty="0"/>
+              <a:t>All Python classes are subclasses of the object class</a:t>
+            </a:r>
+          </a:p>
+          <a:p>
+            <a:r>
+              <a:rPr lang="en-GB" dirty="0"/>
+              <a:t>If we don't explicitly inherit from a different class, classes will automatically inherit from object </a:t>
             </a:r>
           </a:p>
         </p:txBody>
@@ -7614,7 +7661,7 @@
     </p:spTree>
     <p:extLst>
       <p:ext uri="{BB962C8B-B14F-4D97-AF65-F5344CB8AC3E}">
-        <p14:creationId xmlns:p14="http://schemas.microsoft.com/office/powerpoint/2010/main" val="925992457"/>
+        <p14:creationId xmlns:p14="http://schemas.microsoft.com/office/powerpoint/2010/main" val="158887076"/>
       </p:ext>
     </p:extLst>
   </p:cSld>
@@ -7658,7 +7705,15 @@
           <a:p>
             <a:r>
               <a:rPr lang="en-GB" dirty="0"/>
-              <a:t>Methods</a:t>
+              <a:t>**</a:t>
+            </a:r>
+            <a:r>
+              <a:rPr lang="en-GB" dirty="0" err="1"/>
+              <a:t>kwargs</a:t>
+            </a:r>
+            <a:r>
+              <a:rPr lang="en-GB" dirty="0"/>
+              <a:t> syntax</a:t>
             </a:r>
           </a:p>
         </p:txBody>
@@ -7680,15 +7735,74 @@
           <a:p>
             <a:r>
               <a:rPr lang="en-GB" dirty="0"/>
-              <a:t>All methods have one required argument, conventionally named self</a:t>
-            </a:r>
+              <a:t>Collects any keyword arguments passed into the method that were not explicitly listed in the parameter list</a:t>
+            </a:r>
+          </a:p>
+          <a:p>
+            <a:r>
+              <a:rPr lang="en-GB" dirty="0"/>
+              <a:t>These arguments are stored in a dictionary named </a:t>
+            </a:r>
+            <a:r>
+              <a:rPr lang="en-GB" dirty="0" err="1"/>
+              <a:t>kwargs</a:t>
+            </a:r>
+            <a:r>
+              <a:rPr lang="en-GB" dirty="0"/>
+              <a:t> </a:t>
+            </a:r>
+          </a:p>
+          <a:p>
+            <a:pPr lvl="1"/>
+            <a:r>
+              <a:rPr lang="en-GB" dirty="0"/>
+              <a:t>Can call the variable whatever we like, </a:t>
+            </a:r>
+            <a:r>
+              <a:rPr lang="en-GB" dirty="0" err="1"/>
+              <a:t>conventionionally</a:t>
+            </a:r>
+            <a:r>
+              <a:rPr lang="en-GB" dirty="0"/>
+              <a:t> </a:t>
+            </a:r>
+            <a:r>
+              <a:rPr lang="en-GB" dirty="0" err="1"/>
+              <a:t>kwargs</a:t>
+            </a:r>
+            <a:endParaRPr lang="en-GB" dirty="0"/>
+          </a:p>
+          <a:p>
+            <a:r>
+              <a:rPr lang="en-GB" dirty="0"/>
+              <a:t>When we call a different method (e.g. super().__</a:t>
+            </a:r>
+            <a:r>
+              <a:rPr lang="en-GB" dirty="0" err="1"/>
+              <a:t>init</a:t>
+            </a:r>
+            <a:r>
+              <a:rPr lang="en-GB" dirty="0"/>
+              <a:t>__) with a **</a:t>
+            </a:r>
+            <a:r>
+              <a:rPr lang="en-GB" dirty="0" err="1"/>
+              <a:t>kwargs</a:t>
+            </a:r>
+            <a:r>
+              <a:rPr lang="en-GB" dirty="0"/>
+              <a:t> syntax, it unpacks the dictionary and passes the results to the method as normal keyword arguments 	</a:t>
+            </a:r>
+          </a:p>
+          <a:p>
+            <a:endParaRPr lang="en-GB" dirty="0"/>
           </a:p>
         </p:txBody>
       </p:sp>
     </p:spTree>
     <p:extLst>
       <p:ext uri="{BB962C8B-B14F-4D97-AF65-F5344CB8AC3E}">
-        <p14:creationId xmlns:p14="http://schemas.microsoft.com/office/powerpoint/2010/main" val="2948966146"/>
+        <p14:creationId xmlns:p14="http://schemas.microsoft.com/office/powerpoint/2010/main" val="2574568833"/>
       </p:ext>
     </p:extLst>
   </p:cSld>
@@ -7732,15 +7846,7 @@
           <a:p>
             <a:r>
               <a:rPr lang="en-GB" dirty="0"/>
-              <a:t>__</a:t>
-            </a:r>
-            <a:r>
-              <a:rPr lang="en-GB" dirty="0" err="1"/>
-              <a:t>init</a:t>
-            </a:r>
-            <a:r>
-              <a:rPr lang="en-GB" dirty="0"/>
-              <a:t>__</a:t>
+              <a:t>methods go in classes, which go in modules, which go in packages </a:t>
             </a:r>
           </a:p>
         </p:txBody>
@@ -7757,103 +7863,18 @@
         </p:nvSpPr>
         <p:spPr/>
         <p:txBody>
-          <a:bodyPr>
-            <a:normAutofit fontScale="77500" lnSpcReduction="20000"/>
-          </a:bodyPr>
-          <a:lstStyle/>
-          <a:p>
-            <a:r>
-              <a:rPr lang="en-GB" dirty="0"/>
-              <a:t>The Python initialization method is the same as any other method, except it has a special name, __</a:t>
-            </a:r>
-            <a:r>
-              <a:rPr lang="en-GB" dirty="0" err="1"/>
-              <a:t>init</a:t>
-            </a:r>
-            <a:r>
-              <a:rPr lang="en-GB" dirty="0"/>
-              <a:t>__</a:t>
-            </a:r>
-          </a:p>
-          <a:p>
-            <a:r>
-              <a:rPr lang="en-GB" dirty="0"/>
-              <a:t>The leading and trailing double underscores mean this is a special method that the Python interpreter will treat as a special case </a:t>
-            </a:r>
-          </a:p>
-          <a:p>
-            <a:r>
-              <a:rPr lang="en-GB" dirty="0"/>
-              <a:t>Can use the same syntax Python functions use to provide default arguments</a:t>
-            </a:r>
-          </a:p>
-          <a:p>
-            <a:r>
-              <a:rPr lang="en-GB" dirty="0"/>
-              <a:t>The keyword argument syntax appends an equals sign after each variable name</a:t>
-            </a:r>
-          </a:p>
-          <a:p>
-            <a:r>
-              <a:rPr lang="en-GB" dirty="0"/>
-              <a:t>If the calling object does not provide this argument, then the default argument is used instead</a:t>
-            </a:r>
-          </a:p>
-          <a:p>
-            <a:r>
-              <a:rPr lang="en-GB" dirty="0"/>
-              <a:t>The variables will still be available to the function, but they will have the values specified in the argument list</a:t>
-            </a:r>
-          </a:p>
-          <a:p>
-            <a:r>
-              <a:rPr lang="en-GB" dirty="0"/>
-              <a:t>E.g.</a:t>
-            </a:r>
-          </a:p>
-          <a:p>
-            <a:pPr lvl="1"/>
-            <a:r>
-              <a:rPr lang="en-GB" dirty="0"/>
-              <a:t>class Point: </a:t>
-            </a:r>
-          </a:p>
-          <a:p>
-            <a:pPr lvl="1"/>
-            <a:r>
-              <a:rPr lang="en-GB" dirty="0"/>
-              <a:t>    </a:t>
-            </a:r>
-            <a:r>
-              <a:rPr lang="en-GB" dirty="0" err="1"/>
-              <a:t>def</a:t>
-            </a:r>
-            <a:r>
-              <a:rPr lang="en-GB" dirty="0"/>
-              <a:t> __</a:t>
-            </a:r>
-            <a:r>
-              <a:rPr lang="en-GB" dirty="0" err="1"/>
-              <a:t>init</a:t>
-            </a:r>
-            <a:r>
-              <a:rPr lang="en-GB" dirty="0"/>
-              <a:t>__(self, x=0, y=0): </a:t>
-            </a:r>
-          </a:p>
-          <a:p>
-            <a:pPr lvl="1"/>
-            <a:r>
-              <a:rPr lang="en-GB" dirty="0"/>
-              <a:t>    </a:t>
-            </a:r>
-            <a:r>
-              <a:rPr lang="en-GB" dirty="0" err="1"/>
-              <a:t>self.move</a:t>
-            </a:r>
-            <a:r>
-              <a:rPr lang="en-GB" dirty="0"/>
-              <a:t>(x, y) </a:t>
+          <a:bodyPr/>
+          <a:lstStyle/>
+          <a:p>
+            <a:r>
+              <a:rPr lang="en-GB" dirty="0"/>
+              <a:t>Classes can be defined anywhere</a:t>
+            </a:r>
+          </a:p>
+          <a:p>
+            <a:r>
+              <a:rPr lang="en-GB" dirty="0"/>
+              <a:t>They are typically defined at the module level, but they can also be defined inside a function or method </a:t>
             </a:r>
           </a:p>
         </p:txBody>
@@ -7861,7 +7882,7 @@
     </p:spTree>
     <p:extLst>
       <p:ext uri="{BB962C8B-B14F-4D97-AF65-F5344CB8AC3E}">
-        <p14:creationId xmlns:p14="http://schemas.microsoft.com/office/powerpoint/2010/main" val="2361063498"/>
+        <p14:creationId xmlns:p14="http://schemas.microsoft.com/office/powerpoint/2010/main" val="925992457"/>
       </p:ext>
     </p:extLst>
   </p:cSld>
@@ -7904,10 +7925,9 @@
           <a:lstStyle/>
           <a:p>
             <a:r>
-              <a:rPr lang="en-GB" dirty="0" err="1"/>
-              <a:t>Docstrings</a:t>
-            </a:r>
-            <a:endParaRPr lang="en-GB" dirty="0"/>
+              <a:rPr lang="en-GB" dirty="0"/>
+              <a:t>Methods</a:t>
+            </a:r>
           </a:p>
         </p:txBody>
       </p:sp>
@@ -7928,23 +7948,7 @@
           <a:p>
             <a:r>
               <a:rPr lang="en-GB" dirty="0"/>
-              <a:t>Use triple-quotes at the top of a </a:t>
-            </a:r>
-            <a:r>
-              <a:rPr lang="en-GB" dirty="0" err="1"/>
-              <a:t>clas</a:t>
-            </a:r>
-            <a:r>
-              <a:rPr lang="en-GB" dirty="0"/>
-              <a:t> to give </a:t>
-            </a:r>
-            <a:r>
-              <a:rPr lang="en-GB" dirty="0" err="1"/>
-              <a:t>th</a:t>
-            </a:r>
-            <a:r>
-              <a:rPr lang="en-GB" dirty="0"/>
-              <a:t> class some documentation</a:t>
+              <a:t>All methods have one required argument, conventionally named self</a:t>
             </a:r>
           </a:p>
         </p:txBody>
@@ -7952,7 +7956,7 @@
     </p:spTree>
     <p:extLst>
       <p:ext uri="{BB962C8B-B14F-4D97-AF65-F5344CB8AC3E}">
-        <p14:creationId xmlns:p14="http://schemas.microsoft.com/office/powerpoint/2010/main" val="2833408193"/>
+        <p14:creationId xmlns:p14="http://schemas.microsoft.com/office/powerpoint/2010/main" val="2948966146"/>
       </p:ext>
     </p:extLst>
   </p:cSld>
@@ -7996,7 +8000,15 @@
           <a:p>
             <a:r>
               <a:rPr lang="en-GB" dirty="0"/>
-              <a:t>__init__.py</a:t>
+              <a:t>__</a:t>
+            </a:r>
+            <a:r>
+              <a:rPr lang="en-GB" dirty="0" err="1"/>
+              <a:t>init</a:t>
+            </a:r>
+            <a:r>
+              <a:rPr lang="en-GB" dirty="0"/>
+              <a:t>__</a:t>
             </a:r>
           </a:p>
         </p:txBody>
@@ -8013,18 +8025,103 @@
         </p:nvSpPr>
         <p:spPr/>
         <p:txBody>
-          <a:bodyPr/>
-          <a:lstStyle/>
-          <a:p>
-            <a:r>
-              <a:rPr lang="en-GB" dirty="0"/>
-              <a:t>Use it to import from other modules in this package</a:t>
-            </a:r>
-          </a:p>
-          <a:p>
-            <a:r>
-              <a:rPr lang="en-GB" dirty="0"/>
-              <a:t>Write an initialize method to avoid creating classes as soon as imported</a:t>
+          <a:bodyPr>
+            <a:normAutofit fontScale="77500" lnSpcReduction="20000"/>
+          </a:bodyPr>
+          <a:lstStyle/>
+          <a:p>
+            <a:r>
+              <a:rPr lang="en-GB" dirty="0"/>
+              <a:t>The Python initialization method is the same as any other method, except it has a special name, __</a:t>
+            </a:r>
+            <a:r>
+              <a:rPr lang="en-GB" dirty="0" err="1"/>
+              <a:t>init</a:t>
+            </a:r>
+            <a:r>
+              <a:rPr lang="en-GB" dirty="0"/>
+              <a:t>__</a:t>
+            </a:r>
+          </a:p>
+          <a:p>
+            <a:r>
+              <a:rPr lang="en-GB" dirty="0"/>
+              <a:t>The leading and trailing double underscores mean this is a special method that the Python interpreter will treat as a special case </a:t>
+            </a:r>
+          </a:p>
+          <a:p>
+            <a:r>
+              <a:rPr lang="en-GB" dirty="0"/>
+              <a:t>Can use the same syntax Python functions use to provide default arguments</a:t>
+            </a:r>
+          </a:p>
+          <a:p>
+            <a:r>
+              <a:rPr lang="en-GB" dirty="0"/>
+              <a:t>The keyword argument syntax appends an equals sign after each variable name</a:t>
+            </a:r>
+          </a:p>
+          <a:p>
+            <a:r>
+              <a:rPr lang="en-GB" dirty="0"/>
+              <a:t>If the calling object does not provide this argument, then the default argument is used instead</a:t>
+            </a:r>
+          </a:p>
+          <a:p>
+            <a:r>
+              <a:rPr lang="en-GB" dirty="0"/>
+              <a:t>The variables will still be available to the function, but they will have the values specified in the argument list</a:t>
+            </a:r>
+          </a:p>
+          <a:p>
+            <a:r>
+              <a:rPr lang="en-GB" dirty="0"/>
+              <a:t>E.g.</a:t>
+            </a:r>
+          </a:p>
+          <a:p>
+            <a:pPr lvl="1"/>
+            <a:r>
+              <a:rPr lang="en-GB" dirty="0"/>
+              <a:t>class Point: </a:t>
+            </a:r>
+          </a:p>
+          <a:p>
+            <a:pPr lvl="1"/>
+            <a:r>
+              <a:rPr lang="en-GB" dirty="0"/>
+              <a:t>    </a:t>
+            </a:r>
+            <a:r>
+              <a:rPr lang="en-GB" dirty="0" err="1"/>
+              <a:t>def</a:t>
+            </a:r>
+            <a:r>
+              <a:rPr lang="en-GB" dirty="0"/>
+              <a:t> __</a:t>
+            </a:r>
+            <a:r>
+              <a:rPr lang="en-GB" dirty="0" err="1"/>
+              <a:t>init</a:t>
+            </a:r>
+            <a:r>
+              <a:rPr lang="en-GB" dirty="0"/>
+              <a:t>__(self, x=0, y=0): </a:t>
+            </a:r>
+          </a:p>
+          <a:p>
+            <a:pPr lvl="1"/>
+            <a:r>
+              <a:rPr lang="en-GB" dirty="0"/>
+              <a:t>    </a:t>
+            </a:r>
+            <a:r>
+              <a:rPr lang="en-GB" dirty="0" err="1"/>
+              <a:t>self.move</a:t>
+            </a:r>
+            <a:r>
+              <a:rPr lang="en-GB" dirty="0"/>
+              <a:t>(x, y) </a:t>
             </a:r>
           </a:p>
         </p:txBody>
@@ -8032,7 +8129,7 @@
     </p:spTree>
     <p:extLst>
       <p:ext uri="{BB962C8B-B14F-4D97-AF65-F5344CB8AC3E}">
-        <p14:creationId xmlns:p14="http://schemas.microsoft.com/office/powerpoint/2010/main" val="2560270537"/>
+        <p14:creationId xmlns:p14="http://schemas.microsoft.com/office/powerpoint/2010/main" val="2361063498"/>
       </p:ext>
     </p:extLst>
   </p:cSld>
@@ -8208,9 +8305,10 @@
           <a:lstStyle/>
           <a:p>
             <a:r>
-              <a:rPr lang="en-GB" dirty="0"/>
-              <a:t>Using main</a:t>
-            </a:r>
+              <a:rPr lang="en-GB" dirty="0" err="1"/>
+              <a:t>Docstrings</a:t>
+            </a:r>
+            <a:endParaRPr lang="en-GB" dirty="0"/>
           </a:p>
         </p:txBody>
       </p:sp>
@@ -8231,47 +8329,23 @@
           <a:p>
             <a:r>
               <a:rPr lang="en-GB" dirty="0"/>
-              <a:t>As soon as it’s import, any code at the module level is immediately executed</a:t>
-            </a:r>
-          </a:p>
-          <a:p>
-            <a:r>
-              <a:rPr lang="en-GB" dirty="0"/>
-              <a:t>Can end up running the first program when we really only meant to access a couple functions inside that module</a:t>
-            </a:r>
-          </a:p>
-          <a:p>
-            <a:r>
-              <a:rPr lang="en-GB" dirty="0"/>
-              <a:t>To solve this, we should always put </a:t>
+              <a:t>Use triple-quotes at the top of a </a:t>
             </a:r>
             <a:r>
               <a:rPr lang="en-GB" dirty="0" err="1"/>
-              <a:t>startup</a:t>
-            </a:r>
-            <a:r>
-              <a:rPr lang="en-GB" dirty="0"/>
-              <a:t> code in __main__ function </a:t>
-            </a:r>
-          </a:p>
-          <a:p>
-            <a:r>
-              <a:rPr lang="en-GB" dirty="0"/>
-              <a:t>Only execute that function when we know we are running the module as a script </a:t>
-            </a:r>
-          </a:p>
-          <a:p>
-            <a:pPr lvl="1"/>
-            <a:r>
-              <a:rPr lang="en-GB" dirty="0"/>
-              <a:t>if __name__ == "__main__": </a:t>
-            </a:r>
-          </a:p>
-          <a:p>
-            <a:pPr lvl="1"/>
-            <a:r>
-              <a:rPr lang="en-GB" dirty="0"/>
-              <a:t>    main() </a:t>
+              <a:t>clas</a:t>
+            </a:r>
+            <a:r>
+              <a:rPr lang="en-GB" dirty="0"/>
+              <a:t> to give </a:t>
+            </a:r>
+            <a:r>
+              <a:rPr lang="en-GB" dirty="0" err="1"/>
+              <a:t>th</a:t>
+            </a:r>
+            <a:r>
+              <a:rPr lang="en-GB" dirty="0"/>
+              <a:t> class some documentation</a:t>
             </a:r>
           </a:p>
         </p:txBody>
@@ -8279,7 +8353,7 @@
     </p:spTree>
     <p:extLst>
       <p:ext uri="{BB962C8B-B14F-4D97-AF65-F5344CB8AC3E}">
-        <p14:creationId xmlns:p14="http://schemas.microsoft.com/office/powerpoint/2010/main" val="1533444079"/>
+        <p14:creationId xmlns:p14="http://schemas.microsoft.com/office/powerpoint/2010/main" val="2833408193"/>
       </p:ext>
     </p:extLst>
   </p:cSld>
@@ -8323,7 +8397,7 @@
           <a:p>
             <a:r>
               <a:rPr lang="en-GB" dirty="0"/>
-              <a:t>No private/protected members</a:t>
+              <a:t>__init__.py</a:t>
             </a:r>
           </a:p>
         </p:txBody>
@@ -8340,62 +8414,18 @@
         </p:nvSpPr>
         <p:spPr/>
         <p:txBody>
-          <a:bodyPr>
-            <a:normAutofit/>
-          </a:bodyPr>
-          <a:lstStyle/>
-          <a:p>
-            <a:r>
-              <a:rPr lang="en-GB" dirty="0"/>
-              <a:t>Python doesn't enforce laws that might someday get in your way</a:t>
-            </a:r>
-          </a:p>
-          <a:p>
-            <a:r>
-              <a:rPr lang="en-GB" dirty="0"/>
-              <a:t>Instead, it provides unenforced guidelines and best practices</a:t>
-            </a:r>
-          </a:p>
-          <a:p>
-            <a:r>
-              <a:rPr lang="en-GB" dirty="0"/>
-              <a:t>Technically, all methods and attributes on a class are publicly available</a:t>
-            </a:r>
-          </a:p>
-          <a:p>
-            <a:pPr lvl="1"/>
-            <a:r>
-              <a:rPr lang="en-GB" dirty="0"/>
-              <a:t>If we want to suggest that a method should not be used publicly, we can put a note in </a:t>
-            </a:r>
-            <a:r>
-              <a:rPr lang="en-GB" dirty="0" err="1"/>
-              <a:t>docstrings</a:t>
-            </a:r>
-            <a:r>
-              <a:rPr lang="en-GB" dirty="0"/>
-              <a:t> indicating that the method is meant for internal use only </a:t>
-            </a:r>
-          </a:p>
-          <a:p>
-            <a:pPr lvl="1"/>
-            <a:r>
-              <a:rPr lang="en-GB" dirty="0"/>
-              <a:t>By convention also prefix with an underscore character _</a:t>
-            </a:r>
-          </a:p>
-          <a:p>
-            <a:pPr lvl="1"/>
-            <a:r>
-              <a:rPr lang="en-GB" dirty="0"/>
-              <a:t>Prefix with a double underscore __ performs name mangling on the attribute in question </a:t>
-            </a:r>
-          </a:p>
-          <a:p>
-            <a:pPr lvl="1"/>
-            <a:r>
-              <a:rPr lang="en-GB" dirty="0"/>
-              <a:t>There are very few good reasons to use a name-mangled variable in Python </a:t>
+          <a:bodyPr/>
+          <a:lstStyle/>
+          <a:p>
+            <a:r>
+              <a:rPr lang="en-GB" dirty="0"/>
+              <a:t>Use it to import from other modules in this package</a:t>
+            </a:r>
+          </a:p>
+          <a:p>
+            <a:r>
+              <a:rPr lang="en-GB" dirty="0"/>
+              <a:t>Write an initialize method to avoid creating classes as soon as imported</a:t>
             </a:r>
           </a:p>
         </p:txBody>
@@ -8403,7 +8433,7 @@
     </p:spTree>
     <p:extLst>
       <p:ext uri="{BB962C8B-B14F-4D97-AF65-F5344CB8AC3E}">
-        <p14:creationId xmlns:p14="http://schemas.microsoft.com/office/powerpoint/2010/main" val="15037976"/>
+        <p14:creationId xmlns:p14="http://schemas.microsoft.com/office/powerpoint/2010/main" val="2560270537"/>
       </p:ext>
     </p:extLst>
   </p:cSld>
@@ -8447,7 +8477,7 @@
           <a:p>
             <a:r>
               <a:rPr lang="en-GB" dirty="0"/>
-              <a:t>Class Variables</a:t>
+              <a:t>Using main</a:t>
             </a:r>
           </a:p>
         </p:txBody>
@@ -8469,45 +8499,47 @@
           <a:p>
             <a:r>
               <a:rPr lang="en-GB" dirty="0"/>
-              <a:t>Members defined in the class are part of the class definition, shared by all instances of this class </a:t>
-            </a:r>
-          </a:p>
-          <a:p>
-            <a:pPr lvl="1"/>
-            <a:r>
-              <a:rPr lang="en-GB" dirty="0"/>
-              <a:t>If you set</a:t>
-            </a:r>
-            <a:r>
-              <a:rPr lang="en-GB" i="1" dirty="0"/>
-              <a:t> </a:t>
-            </a:r>
-            <a:r>
-              <a:rPr lang="en-GB" dirty="0"/>
-              <a:t>the variable using </a:t>
+              <a:t>As soon as it’s import, any code at the module level is immediately executed</a:t>
+            </a:r>
+          </a:p>
+          <a:p>
+            <a:r>
+              <a:rPr lang="en-GB" dirty="0"/>
+              <a:t>Can end up running the first program when we really only meant to access a couple functions inside that module</a:t>
+            </a:r>
+          </a:p>
+          <a:p>
+            <a:r>
+              <a:rPr lang="en-GB" dirty="0"/>
+              <a:t>To solve this, we should always put </a:t>
             </a:r>
             <a:r>
               <a:rPr lang="en-GB" dirty="0" err="1"/>
-              <a:t>self.some_variable</a:t>
-            </a:r>
-            <a:r>
-              <a:rPr lang="en-GB" dirty="0"/>
-              <a:t>, you will actually be creating a new</a:t>
-            </a:r>
-            <a:r>
-              <a:rPr lang="en-GB" b="1" dirty="0"/>
-              <a:t> </a:t>
-            </a:r>
-            <a:r>
-              <a:rPr lang="en-GB" dirty="0"/>
-              <a:t>instance variable (associated only with that object)</a:t>
-            </a:r>
-          </a:p>
-          <a:p>
-            <a:pPr lvl="1"/>
-            <a:r>
-              <a:rPr lang="en-GB" dirty="0"/>
-              <a:t>The class variable will still be unchanged</a:t>
+              <a:t>startup</a:t>
+            </a:r>
+            <a:r>
+              <a:rPr lang="en-GB" dirty="0"/>
+              <a:t> code in __main__ function </a:t>
+            </a:r>
+          </a:p>
+          <a:p>
+            <a:r>
+              <a:rPr lang="en-GB" dirty="0"/>
+              <a:t>Only execute that function when we know we are running the module as a script </a:t>
+            </a:r>
+          </a:p>
+          <a:p>
+            <a:pPr lvl="1"/>
+            <a:r>
+              <a:rPr lang="en-GB" dirty="0"/>
+              <a:t>if __name__ == "__main__": </a:t>
+            </a:r>
+          </a:p>
+          <a:p>
+            <a:pPr lvl="1"/>
+            <a:r>
+              <a:rPr lang="en-GB" dirty="0"/>
+              <a:t>    main() </a:t>
             </a:r>
           </a:p>
         </p:txBody>
@@ -8515,7 +8547,7 @@
     </p:spTree>
     <p:extLst>
       <p:ext uri="{BB962C8B-B14F-4D97-AF65-F5344CB8AC3E}">
-        <p14:creationId xmlns:p14="http://schemas.microsoft.com/office/powerpoint/2010/main" val="564272510"/>
+        <p14:creationId xmlns:p14="http://schemas.microsoft.com/office/powerpoint/2010/main" val="1533444079"/>
       </p:ext>
     </p:extLst>
   </p:cSld>
@@ -8557,7 +8589,10 @@
           <a:bodyPr/>
           <a:lstStyle/>
           <a:p>
-            <a:endParaRPr lang="en-GB" dirty="0"/>
+            <a:r>
+              <a:rPr lang="en-GB" dirty="0"/>
+              <a:t>No private/protected members</a:t>
+            </a:r>
           </a:p>
         </p:txBody>
       </p:sp>
@@ -8573,56 +8608,62 @@
         </p:nvSpPr>
         <p:spPr/>
         <p:txBody>
-          <a:bodyPr/>
-          <a:lstStyle/>
-          <a:p>
-            <a:r>
-              <a:rPr lang="en-GB" dirty="0"/>
-              <a:t>the list itself extends the object class: </a:t>
-            </a:r>
-          </a:p>
-          <a:p>
-            <a:pPr lvl="1"/>
-            <a:r>
-              <a:rPr lang="en-GB" dirty="0"/>
-              <a:t>&gt;&gt;&gt; </a:t>
+          <a:bodyPr>
+            <a:normAutofit/>
+          </a:bodyPr>
+          <a:lstStyle/>
+          <a:p>
+            <a:r>
+              <a:rPr lang="en-GB" dirty="0"/>
+              <a:t>Python doesn't enforce laws that might someday get in your way</a:t>
+            </a:r>
+          </a:p>
+          <a:p>
+            <a:r>
+              <a:rPr lang="en-GB" dirty="0"/>
+              <a:t>Instead, it provides unenforced guidelines and best practices</a:t>
+            </a:r>
+          </a:p>
+          <a:p>
+            <a:r>
+              <a:rPr lang="en-GB" dirty="0"/>
+              <a:t>Technically, all methods and attributes on a class are publicly available</a:t>
+            </a:r>
+          </a:p>
+          <a:p>
+            <a:pPr lvl="1"/>
+            <a:r>
+              <a:rPr lang="en-GB" dirty="0"/>
+              <a:t>If we want to suggest that a method should not be used publicly, we can put a note in </a:t>
             </a:r>
             <a:r>
               <a:rPr lang="en-GB" dirty="0" err="1"/>
-              <a:t>isinstance</a:t>
-            </a:r>
-            <a:r>
-              <a:rPr lang="en-GB" dirty="0"/>
-              <a:t>([], object) </a:t>
-            </a:r>
-          </a:p>
-          <a:p>
-            <a:pPr lvl="1"/>
-            <a:r>
-              <a:rPr lang="en-GB" dirty="0"/>
-              <a:t>True </a:t>
-            </a:r>
-          </a:p>
-          <a:p>
-            <a:r>
-              <a:rPr lang="en-GB" dirty="0"/>
-              <a:t>Most built-in types can be similarly extended. Commonly extended built-ins are object, list, set, </a:t>
-            </a:r>
-            <a:r>
-              <a:rPr lang="en-GB" dirty="0" err="1"/>
-              <a:t>dict</a:t>
-            </a:r>
-            <a:r>
-              <a:rPr lang="en-GB" dirty="0"/>
-              <a:t>, file, and str. Numerical types such as </a:t>
-            </a:r>
-            <a:r>
-              <a:rPr lang="en-GB" dirty="0" err="1"/>
-              <a:t>int</a:t>
-            </a:r>
-            <a:r>
-              <a:rPr lang="en-GB" dirty="0"/>
-              <a:t> and float are also occasionally inherited from </a:t>
+              <a:t>docstrings</a:t>
+            </a:r>
+            <a:r>
+              <a:rPr lang="en-GB" dirty="0"/>
+              <a:t> indicating that the method is meant for internal use only </a:t>
+            </a:r>
+          </a:p>
+          <a:p>
+            <a:pPr lvl="1"/>
+            <a:r>
+              <a:rPr lang="en-GB" dirty="0"/>
+              <a:t>By convention also prefix with an underscore character _</a:t>
+            </a:r>
+          </a:p>
+          <a:p>
+            <a:pPr lvl="1"/>
+            <a:r>
+              <a:rPr lang="en-GB" dirty="0"/>
+              <a:t>Prefix with a double underscore __ performs name mangling on the attribute in question </a:t>
+            </a:r>
+          </a:p>
+          <a:p>
+            <a:pPr lvl="1"/>
+            <a:r>
+              <a:rPr lang="en-GB" dirty="0"/>
+              <a:t>There are very few good reasons to use a name-mangled variable in Python </a:t>
             </a:r>
           </a:p>
         </p:txBody>
@@ -8630,7 +8671,7 @@
     </p:spTree>
     <p:extLst>
       <p:ext uri="{BB962C8B-B14F-4D97-AF65-F5344CB8AC3E}">
-        <p14:creationId xmlns:p14="http://schemas.microsoft.com/office/powerpoint/2010/main" val="3033899748"/>
+        <p14:creationId xmlns:p14="http://schemas.microsoft.com/office/powerpoint/2010/main" val="15037976"/>
       </p:ext>
     </p:extLst>
   </p:cSld>
@@ -8673,6 +8714,233 @@
           <a:lstStyle/>
           <a:p>
             <a:r>
+              <a:rPr lang="en-GB" dirty="0"/>
+              <a:t>Class Variables</a:t>
+            </a:r>
+          </a:p>
+        </p:txBody>
+      </p:sp>
+      <p:sp>
+        <p:nvSpPr>
+          <p:cNvPr id="3" name="Content Placeholder 2"/>
+          <p:cNvSpPr>
+            <a:spLocks noGrp="1"/>
+          </p:cNvSpPr>
+          <p:nvPr>
+            <p:ph idx="1"/>
+          </p:nvPr>
+        </p:nvSpPr>
+        <p:spPr/>
+        <p:txBody>
+          <a:bodyPr/>
+          <a:lstStyle/>
+          <a:p>
+            <a:r>
+              <a:rPr lang="en-GB" dirty="0"/>
+              <a:t>Members defined in the class are part of the class definition, shared by all instances of this class </a:t>
+            </a:r>
+          </a:p>
+          <a:p>
+            <a:pPr lvl="1"/>
+            <a:r>
+              <a:rPr lang="en-GB" dirty="0"/>
+              <a:t>If you set</a:t>
+            </a:r>
+            <a:r>
+              <a:rPr lang="en-GB" i="1" dirty="0"/>
+              <a:t> </a:t>
+            </a:r>
+            <a:r>
+              <a:rPr lang="en-GB" dirty="0"/>
+              <a:t>the variable using </a:t>
+            </a:r>
+            <a:r>
+              <a:rPr lang="en-GB" dirty="0" err="1"/>
+              <a:t>self.some_variable</a:t>
+            </a:r>
+            <a:r>
+              <a:rPr lang="en-GB" dirty="0"/>
+              <a:t>, you will actually be creating a new</a:t>
+            </a:r>
+            <a:r>
+              <a:rPr lang="en-GB" b="1" dirty="0"/>
+              <a:t> </a:t>
+            </a:r>
+            <a:r>
+              <a:rPr lang="en-GB" dirty="0"/>
+              <a:t>instance variable (associated only with that object)</a:t>
+            </a:r>
+          </a:p>
+          <a:p>
+            <a:pPr lvl="1"/>
+            <a:r>
+              <a:rPr lang="en-GB" dirty="0"/>
+              <a:t>The class variable will still be unchanged</a:t>
+            </a:r>
+          </a:p>
+        </p:txBody>
+      </p:sp>
+    </p:spTree>
+    <p:extLst>
+      <p:ext uri="{BB962C8B-B14F-4D97-AF65-F5344CB8AC3E}">
+        <p14:creationId xmlns:p14="http://schemas.microsoft.com/office/powerpoint/2010/main" val="564272510"/>
+      </p:ext>
+    </p:extLst>
+  </p:cSld>
+  <p:clrMapOvr>
+    <a:masterClrMapping/>
+  </p:clrMapOvr>
+</p:sld>
+</file>
+
+<file path=ppt/slides/slide45.xml><?xml version="1.0" encoding="utf-8"?>
+<p:sld xmlns:a="http://schemas.openxmlformats.org/drawingml/2006/main" xmlns:r="http://schemas.openxmlformats.org/officeDocument/2006/relationships" xmlns:p="http://schemas.openxmlformats.org/presentationml/2006/main">
+  <p:cSld>
+    <p:spTree>
+      <p:nvGrpSpPr>
+        <p:cNvPr id="1" name=""/>
+        <p:cNvGrpSpPr/>
+        <p:nvPr/>
+      </p:nvGrpSpPr>
+      <p:grpSpPr>
+        <a:xfrm>
+          <a:off x="0" y="0"/>
+          <a:ext cx="0" cy="0"/>
+          <a:chOff x="0" y="0"/>
+          <a:chExt cx="0" cy="0"/>
+        </a:xfrm>
+      </p:grpSpPr>
+      <p:sp>
+        <p:nvSpPr>
+          <p:cNvPr id="2" name="Title 1"/>
+          <p:cNvSpPr>
+            <a:spLocks noGrp="1"/>
+          </p:cNvSpPr>
+          <p:nvPr>
+            <p:ph type="title"/>
+          </p:nvPr>
+        </p:nvSpPr>
+        <p:spPr/>
+        <p:txBody>
+          <a:bodyPr/>
+          <a:lstStyle/>
+          <a:p>
+            <a:endParaRPr lang="en-GB" dirty="0"/>
+          </a:p>
+        </p:txBody>
+      </p:sp>
+      <p:sp>
+        <p:nvSpPr>
+          <p:cNvPr id="3" name="Content Placeholder 2"/>
+          <p:cNvSpPr>
+            <a:spLocks noGrp="1"/>
+          </p:cNvSpPr>
+          <p:nvPr>
+            <p:ph idx="1"/>
+          </p:nvPr>
+        </p:nvSpPr>
+        <p:spPr/>
+        <p:txBody>
+          <a:bodyPr/>
+          <a:lstStyle/>
+          <a:p>
+            <a:r>
+              <a:rPr lang="en-GB" dirty="0"/>
+              <a:t>the list itself extends the object class: </a:t>
+            </a:r>
+          </a:p>
+          <a:p>
+            <a:pPr lvl="1"/>
+            <a:r>
+              <a:rPr lang="en-GB" dirty="0"/>
+              <a:t>&gt;&gt;&gt; </a:t>
+            </a:r>
+            <a:r>
+              <a:rPr lang="en-GB" dirty="0" err="1"/>
+              <a:t>isinstance</a:t>
+            </a:r>
+            <a:r>
+              <a:rPr lang="en-GB" dirty="0"/>
+              <a:t>([], object) </a:t>
+            </a:r>
+          </a:p>
+          <a:p>
+            <a:pPr lvl="1"/>
+            <a:r>
+              <a:rPr lang="en-GB" dirty="0"/>
+              <a:t>True </a:t>
+            </a:r>
+          </a:p>
+          <a:p>
+            <a:r>
+              <a:rPr lang="en-GB" dirty="0"/>
+              <a:t>Most built-in types can be similarly extended. Commonly extended built-ins are object, list, set, </a:t>
+            </a:r>
+            <a:r>
+              <a:rPr lang="en-GB" dirty="0" err="1"/>
+              <a:t>dict</a:t>
+            </a:r>
+            <a:r>
+              <a:rPr lang="en-GB" dirty="0"/>
+              <a:t>, file, and str. Numerical types such as </a:t>
+            </a:r>
+            <a:r>
+              <a:rPr lang="en-GB" dirty="0" err="1"/>
+              <a:t>int</a:t>
+            </a:r>
+            <a:r>
+              <a:rPr lang="en-GB" dirty="0"/>
+              <a:t> and float are also occasionally inherited from </a:t>
+            </a:r>
+          </a:p>
+        </p:txBody>
+      </p:sp>
+    </p:spTree>
+    <p:extLst>
+      <p:ext uri="{BB962C8B-B14F-4D97-AF65-F5344CB8AC3E}">
+        <p14:creationId xmlns:p14="http://schemas.microsoft.com/office/powerpoint/2010/main" val="3033899748"/>
+      </p:ext>
+    </p:extLst>
+  </p:cSld>
+  <p:clrMapOvr>
+    <a:masterClrMapping/>
+  </p:clrMapOvr>
+</p:sld>
+</file>
+
+<file path=ppt/slides/slide46.xml><?xml version="1.0" encoding="utf-8"?>
+<p:sld xmlns:a="http://schemas.openxmlformats.org/drawingml/2006/main" xmlns:r="http://schemas.openxmlformats.org/officeDocument/2006/relationships" xmlns:p="http://schemas.openxmlformats.org/presentationml/2006/main">
+  <p:cSld>
+    <p:spTree>
+      <p:nvGrpSpPr>
+        <p:cNvPr id="1" name=""/>
+        <p:cNvGrpSpPr/>
+        <p:nvPr/>
+      </p:nvGrpSpPr>
+      <p:grpSpPr>
+        <a:xfrm>
+          <a:off x="0" y="0"/>
+          <a:ext cx="0" cy="0"/>
+          <a:chOff x="0" y="0"/>
+          <a:chExt cx="0" cy="0"/>
+        </a:xfrm>
+      </p:grpSpPr>
+      <p:sp>
+        <p:nvSpPr>
+          <p:cNvPr id="2" name="Title 1"/>
+          <p:cNvSpPr>
+            <a:spLocks noGrp="1"/>
+          </p:cNvSpPr>
+          <p:nvPr>
+            <p:ph type="title"/>
+          </p:nvPr>
+        </p:nvSpPr>
+        <p:spPr/>
+        <p:txBody>
+          <a:bodyPr/>
+          <a:lstStyle/>
+          <a:p>
+            <a:r>
               <a:rPr lang="en-GB" dirty="0" err="1"/>
               <a:t>PyCharm</a:t>
             </a:r>
@@ -8763,7 +9031,7 @@
 </p:sld>
 </file>
 
-<file path=ppt/slides/slide45.xml><?xml version="1.0" encoding="utf-8"?>
+<file path=ppt/slides/slide47.xml><?xml version="1.0" encoding="utf-8"?>
 <p:sld xmlns:a="http://schemas.openxmlformats.org/drawingml/2006/main" xmlns:r="http://schemas.openxmlformats.org/officeDocument/2006/relationships" xmlns:p="http://schemas.openxmlformats.org/presentationml/2006/main">
   <p:cSld>
     <p:spTree>

</xml_diff>